<commit_message>
finishing slides, adding in hw answers
</commit_message>
<xml_diff>
--- a/projectB/day07/slides/Day7_slides.pptx
+++ b/projectB/day07/slides/Day7_slides.pptx
@@ -5,40 +5,39 @@
     <p:sldMasterId id="2147483659" r:id="rId1"/>
   </p:sldMasterIdLst>
   <p:notesMasterIdLst>
-    <p:notesMasterId r:id="rId16"/>
+    <p:notesMasterId r:id="rId15"/>
   </p:notesMasterIdLst>
   <p:sldIdLst>
     <p:sldId id="256" r:id="rId2"/>
-    <p:sldId id="257" r:id="rId3"/>
+    <p:sldId id="270" r:id="rId3"/>
     <p:sldId id="258" r:id="rId4"/>
     <p:sldId id="259" r:id="rId5"/>
-    <p:sldId id="260" r:id="rId6"/>
-    <p:sldId id="261" r:id="rId7"/>
-    <p:sldId id="262" r:id="rId8"/>
-    <p:sldId id="263" r:id="rId9"/>
-    <p:sldId id="264" r:id="rId10"/>
-    <p:sldId id="265" r:id="rId11"/>
-    <p:sldId id="266" r:id="rId12"/>
-    <p:sldId id="267" r:id="rId13"/>
-    <p:sldId id="268" r:id="rId14"/>
-    <p:sldId id="269" r:id="rId15"/>
+    <p:sldId id="263" r:id="rId6"/>
+    <p:sldId id="264" r:id="rId7"/>
+    <p:sldId id="265" r:id="rId8"/>
+    <p:sldId id="261" r:id="rId9"/>
+    <p:sldId id="262" r:id="rId10"/>
+    <p:sldId id="266" r:id="rId11"/>
+    <p:sldId id="267" r:id="rId12"/>
+    <p:sldId id="268" r:id="rId13"/>
+    <p:sldId id="269" r:id="rId14"/>
   </p:sldIdLst>
   <p:sldSz cx="9144000" cy="5143500" type="screen16x9"/>
   <p:notesSz cx="6858000" cy="9144000"/>
   <p:embeddedFontLst>
     <p:embeddedFont>
       <p:font typeface="Consolas" panose="020B0609020204030204" pitchFamily="49" charset="0"/>
-      <p:regular r:id="rId17"/>
-      <p:bold r:id="rId18"/>
-      <p:italic r:id="rId19"/>
-      <p:boldItalic r:id="rId20"/>
+      <p:regular r:id="rId16"/>
+      <p:bold r:id="rId17"/>
+      <p:italic r:id="rId18"/>
+      <p:boldItalic r:id="rId19"/>
     </p:embeddedFont>
     <p:embeddedFont>
       <p:font typeface="Helvetica Neue" panose="02000503000000020004" pitchFamily="2" charset="0"/>
-      <p:regular r:id="rId21"/>
-      <p:bold r:id="rId22"/>
-      <p:italic r:id="rId23"/>
-      <p:boldItalic r:id="rId24"/>
+      <p:regular r:id="rId20"/>
+      <p:bold r:id="rId21"/>
+      <p:italic r:id="rId22"/>
+      <p:boldItalic r:id="rId23"/>
     </p:embeddedFont>
   </p:embeddedFontLst>
   <p:defaultTextStyle>
@@ -857,214 +856,6 @@
   <p:cSld>
     <p:spTree>
       <p:nvGrpSpPr>
-        <p:cNvPr id="1" name="Shape 123"/>
-        <p:cNvGrpSpPr/>
-        <p:nvPr/>
-      </p:nvGrpSpPr>
-      <p:grpSpPr>
-        <a:xfrm>
-          <a:off x="0" y="0"/>
-          <a:ext cx="0" cy="0"/>
-          <a:chOff x="0" y="0"/>
-          <a:chExt cx="0" cy="0"/>
-        </a:xfrm>
-      </p:grpSpPr>
-      <p:sp>
-        <p:nvSpPr>
-          <p:cNvPr id="124" name="Google Shape;124;g258956bab95_0_5:notes"/>
-          <p:cNvSpPr>
-            <a:spLocks noGrp="1" noRot="1" noChangeAspect="1"/>
-          </p:cNvSpPr>
-          <p:nvPr>
-            <p:ph type="sldImg" idx="2"/>
-          </p:nvPr>
-        </p:nvSpPr>
-        <p:spPr>
-          <a:xfrm>
-            <a:off x="381000" y="685800"/>
-            <a:ext cx="6096000" cy="3429000"/>
-          </a:xfrm>
-          <a:custGeom>
-            <a:avLst/>
-            <a:gdLst/>
-            <a:ahLst/>
-            <a:cxnLst/>
-            <a:rect l="l" t="t" r="r" b="b"/>
-            <a:pathLst>
-              <a:path w="120000" h="120000" extrusionOk="0">
-                <a:moveTo>
-                  <a:pt x="0" y="0"/>
-                </a:moveTo>
-                <a:lnTo>
-                  <a:pt x="120000" y="0"/>
-                </a:lnTo>
-                <a:lnTo>
-                  <a:pt x="120000" y="120000"/>
-                </a:lnTo>
-                <a:lnTo>
-                  <a:pt x="0" y="120000"/>
-                </a:lnTo>
-                <a:close/>
-              </a:path>
-            </a:pathLst>
-          </a:custGeom>
-        </p:spPr>
-      </p:sp>
-      <p:sp>
-        <p:nvSpPr>
-          <p:cNvPr id="125" name="Google Shape;125;g258956bab95_0_5:notes"/>
-          <p:cNvSpPr txBox="1">
-            <a:spLocks noGrp="1"/>
-          </p:cNvSpPr>
-          <p:nvPr>
-            <p:ph type="body" idx="1"/>
-          </p:nvPr>
-        </p:nvSpPr>
-        <p:spPr>
-          <a:xfrm>
-            <a:off x="685800" y="4343400"/>
-            <a:ext cx="5486400" cy="4114800"/>
-          </a:xfrm>
-          <a:prstGeom prst="rect">
-            <a:avLst/>
-          </a:prstGeom>
-        </p:spPr>
-        <p:txBody>
-          <a:bodyPr spcFirstLastPara="1" wrap="square" lIns="91425" tIns="91425" rIns="91425" bIns="91425" anchor="t" anchorCtr="0">
-            <a:noAutofit/>
-          </a:bodyPr>
-          <a:lstStyle/>
-          <a:p>
-            <a:pPr marL="0" lvl="0" indent="0" algn="l" rtl="0">
-              <a:spcBef>
-                <a:spcPts val="0"/>
-              </a:spcBef>
-              <a:spcAft>
-                <a:spcPts val="0"/>
-              </a:spcAft>
-              <a:buNone/>
-            </a:pPr>
-            <a:endParaRPr/>
-          </a:p>
-        </p:txBody>
-      </p:sp>
-    </p:spTree>
-  </p:cSld>
-  <p:clrMapOvr>
-    <a:masterClrMapping/>
-  </p:clrMapOvr>
-</p:notes>
-</file>
-
-<file path=ppt/notesSlides/notesSlide11.xml><?xml version="1.0" encoding="utf-8"?>
-<p:notes xmlns:a="http://schemas.openxmlformats.org/drawingml/2006/main" xmlns:r="http://schemas.openxmlformats.org/officeDocument/2006/relationships" xmlns:p="http://schemas.openxmlformats.org/presentationml/2006/main" showMasterSp="0" showMasterPhAnim="0">
-  <p:cSld>
-    <p:spTree>
-      <p:nvGrpSpPr>
-        <p:cNvPr id="1" name="Shape 130"/>
-        <p:cNvGrpSpPr/>
-        <p:nvPr/>
-      </p:nvGrpSpPr>
-      <p:grpSpPr>
-        <a:xfrm>
-          <a:off x="0" y="0"/>
-          <a:ext cx="0" cy="0"/>
-          <a:chOff x="0" y="0"/>
-          <a:chExt cx="0" cy="0"/>
-        </a:xfrm>
-      </p:grpSpPr>
-      <p:sp>
-        <p:nvSpPr>
-          <p:cNvPr id="131" name="Google Shape;131;g22ea25fd1ab_0_152:notes"/>
-          <p:cNvSpPr>
-            <a:spLocks noGrp="1" noRot="1" noChangeAspect="1"/>
-          </p:cNvSpPr>
-          <p:nvPr>
-            <p:ph type="sldImg" idx="2"/>
-          </p:nvPr>
-        </p:nvSpPr>
-        <p:spPr>
-          <a:xfrm>
-            <a:off x="381000" y="685800"/>
-            <a:ext cx="6096000" cy="3429000"/>
-          </a:xfrm>
-          <a:custGeom>
-            <a:avLst/>
-            <a:gdLst/>
-            <a:ahLst/>
-            <a:cxnLst/>
-            <a:rect l="l" t="t" r="r" b="b"/>
-            <a:pathLst>
-              <a:path w="120000" h="120000" extrusionOk="0">
-                <a:moveTo>
-                  <a:pt x="0" y="0"/>
-                </a:moveTo>
-                <a:lnTo>
-                  <a:pt x="120000" y="0"/>
-                </a:lnTo>
-                <a:lnTo>
-                  <a:pt x="120000" y="120000"/>
-                </a:lnTo>
-                <a:lnTo>
-                  <a:pt x="0" y="120000"/>
-                </a:lnTo>
-                <a:close/>
-              </a:path>
-            </a:pathLst>
-          </a:custGeom>
-        </p:spPr>
-      </p:sp>
-      <p:sp>
-        <p:nvSpPr>
-          <p:cNvPr id="132" name="Google Shape;132;g22ea25fd1ab_0_152:notes"/>
-          <p:cNvSpPr txBox="1">
-            <a:spLocks noGrp="1"/>
-          </p:cNvSpPr>
-          <p:nvPr>
-            <p:ph type="body" idx="1"/>
-          </p:nvPr>
-        </p:nvSpPr>
-        <p:spPr>
-          <a:xfrm>
-            <a:off x="685800" y="4343400"/>
-            <a:ext cx="5486400" cy="4114800"/>
-          </a:xfrm>
-          <a:prstGeom prst="rect">
-            <a:avLst/>
-          </a:prstGeom>
-        </p:spPr>
-        <p:txBody>
-          <a:bodyPr spcFirstLastPara="1" wrap="square" lIns="91425" tIns="91425" rIns="91425" bIns="91425" anchor="t" anchorCtr="0">
-            <a:noAutofit/>
-          </a:bodyPr>
-          <a:lstStyle/>
-          <a:p>
-            <a:pPr marL="0" lvl="0" indent="0" algn="l" rtl="0">
-              <a:spcBef>
-                <a:spcPts val="0"/>
-              </a:spcBef>
-              <a:spcAft>
-                <a:spcPts val="0"/>
-              </a:spcAft>
-              <a:buNone/>
-            </a:pPr>
-            <a:endParaRPr/>
-          </a:p>
-        </p:txBody>
-      </p:sp>
-    </p:spTree>
-  </p:cSld>
-  <p:clrMapOvr>
-    <a:masterClrMapping/>
-  </p:clrMapOvr>
-</p:notes>
-</file>
-
-<file path=ppt/notesSlides/notesSlide12.xml><?xml version="1.0" encoding="utf-8"?>
-<p:notes xmlns:a="http://schemas.openxmlformats.org/drawingml/2006/main" xmlns:r="http://schemas.openxmlformats.org/officeDocument/2006/relationships" xmlns:p="http://schemas.openxmlformats.org/presentationml/2006/main" showMasterSp="0" showMasterPhAnim="0">
-  <p:cSld>
-    <p:spTree>
-      <p:nvGrpSpPr>
         <p:cNvPr id="1" name="Shape 137"/>
         <p:cNvGrpSpPr/>
         <p:nvPr/>
@@ -1164,7 +955,7 @@
 </p:notes>
 </file>
 
-<file path=ppt/notesSlides/notesSlide13.xml><?xml version="1.0" encoding="utf-8"?>
+<file path=ppt/notesSlides/notesSlide11.xml><?xml version="1.0" encoding="utf-8"?>
 <p:notes xmlns:a="http://schemas.openxmlformats.org/drawingml/2006/main" xmlns:r="http://schemas.openxmlformats.org/officeDocument/2006/relationships" xmlns:p="http://schemas.openxmlformats.org/presentationml/2006/main" showMasterSp="0" showMasterPhAnim="0">
   <p:cSld>
     <p:spTree>
@@ -1268,7 +1059,7 @@
 </p:notes>
 </file>
 
-<file path=ppt/notesSlides/notesSlide14.xml><?xml version="1.0" encoding="utf-8"?>
+<file path=ppt/notesSlides/notesSlide12.xml><?xml version="1.0" encoding="utf-8"?>
 <p:notes xmlns:a="http://schemas.openxmlformats.org/drawingml/2006/main" xmlns:r="http://schemas.openxmlformats.org/officeDocument/2006/relationships" xmlns:p="http://schemas.openxmlformats.org/presentationml/2006/main" showMasterSp="0" showMasterPhAnim="0">
   <p:cSld>
     <p:spTree>
@@ -1377,110 +1168,6 @@
   <p:cSld>
     <p:spTree>
       <p:nvGrpSpPr>
-        <p:cNvPr id="1" name="Shape 56"/>
-        <p:cNvGrpSpPr/>
-        <p:nvPr/>
-      </p:nvGrpSpPr>
-      <p:grpSpPr>
-        <a:xfrm>
-          <a:off x="0" y="0"/>
-          <a:ext cx="0" cy="0"/>
-          <a:chOff x="0" y="0"/>
-          <a:chExt cx="0" cy="0"/>
-        </a:xfrm>
-      </p:grpSpPr>
-      <p:sp>
-        <p:nvSpPr>
-          <p:cNvPr id="57" name="Google Shape;57;g22ea25fd1ab_0_136:notes"/>
-          <p:cNvSpPr>
-            <a:spLocks noGrp="1" noRot="1" noChangeAspect="1"/>
-          </p:cNvSpPr>
-          <p:nvPr>
-            <p:ph type="sldImg" idx="2"/>
-          </p:nvPr>
-        </p:nvSpPr>
-        <p:spPr>
-          <a:xfrm>
-            <a:off x="381300" y="685800"/>
-            <a:ext cx="6096000" cy="3429000"/>
-          </a:xfrm>
-          <a:custGeom>
-            <a:avLst/>
-            <a:gdLst/>
-            <a:ahLst/>
-            <a:cxnLst/>
-            <a:rect l="l" t="t" r="r" b="b"/>
-            <a:pathLst>
-              <a:path w="120000" h="120000" extrusionOk="0">
-                <a:moveTo>
-                  <a:pt x="0" y="0"/>
-                </a:moveTo>
-                <a:lnTo>
-                  <a:pt x="120000" y="0"/>
-                </a:lnTo>
-                <a:lnTo>
-                  <a:pt x="120000" y="120000"/>
-                </a:lnTo>
-                <a:lnTo>
-                  <a:pt x="0" y="120000"/>
-                </a:lnTo>
-                <a:close/>
-              </a:path>
-            </a:pathLst>
-          </a:custGeom>
-        </p:spPr>
-      </p:sp>
-      <p:sp>
-        <p:nvSpPr>
-          <p:cNvPr id="58" name="Google Shape;58;g22ea25fd1ab_0_136:notes"/>
-          <p:cNvSpPr txBox="1">
-            <a:spLocks noGrp="1"/>
-          </p:cNvSpPr>
-          <p:nvPr>
-            <p:ph type="body" idx="1"/>
-          </p:nvPr>
-        </p:nvSpPr>
-        <p:spPr>
-          <a:xfrm>
-            <a:off x="685800" y="4343400"/>
-            <a:ext cx="5486400" cy="4114800"/>
-          </a:xfrm>
-          <a:prstGeom prst="rect">
-            <a:avLst/>
-          </a:prstGeom>
-        </p:spPr>
-        <p:txBody>
-          <a:bodyPr spcFirstLastPara="1" wrap="square" lIns="91425" tIns="91425" rIns="91425" bIns="91425" anchor="t" anchorCtr="0">
-            <a:noAutofit/>
-          </a:bodyPr>
-          <a:lstStyle/>
-          <a:p>
-            <a:pPr marL="0" lvl="0" indent="0" algn="l" rtl="0">
-              <a:spcBef>
-                <a:spcPts val="0"/>
-              </a:spcBef>
-              <a:spcAft>
-                <a:spcPts val="0"/>
-              </a:spcAft>
-              <a:buNone/>
-            </a:pPr>
-            <a:endParaRPr/>
-          </a:p>
-        </p:txBody>
-      </p:sp>
-    </p:spTree>
-  </p:cSld>
-  <p:clrMapOvr>
-    <a:masterClrMapping/>
-  </p:clrMapOvr>
-</p:notes>
-</file>
-
-<file path=ppt/notesSlides/notesSlide3.xml><?xml version="1.0" encoding="utf-8"?>
-<p:notes xmlns:a="http://schemas.openxmlformats.org/drawingml/2006/main" xmlns:r="http://schemas.openxmlformats.org/officeDocument/2006/relationships" xmlns:p="http://schemas.openxmlformats.org/presentationml/2006/main" showMasterSp="0" showMasterPhAnim="0">
-  <p:cSld>
-    <p:spTree>
-      <p:nvGrpSpPr>
         <p:cNvPr id="1" name="Shape 63"/>
         <p:cNvGrpSpPr/>
         <p:nvPr/>
@@ -1580,7 +1267,7 @@
 </p:notes>
 </file>
 
-<file path=ppt/notesSlides/notesSlide4.xml><?xml version="1.0" encoding="utf-8"?>
+<file path=ppt/notesSlides/notesSlide3.xml><?xml version="1.0" encoding="utf-8"?>
 <p:notes xmlns:a="http://schemas.openxmlformats.org/drawingml/2006/main" xmlns:r="http://schemas.openxmlformats.org/officeDocument/2006/relationships" xmlns:p="http://schemas.openxmlformats.org/presentationml/2006/main" showMasterSp="0" showMasterPhAnim="0">
   <p:cSld>
     <p:spTree>
@@ -1702,337 +1389,7 @@
 </p:notes>
 </file>
 
-<file path=ppt/notesSlides/notesSlide5.xml><?xml version="1.0" encoding="utf-8"?>
-<p:notes xmlns:a="http://schemas.openxmlformats.org/drawingml/2006/main" xmlns:r="http://schemas.openxmlformats.org/officeDocument/2006/relationships" xmlns:p="http://schemas.openxmlformats.org/presentationml/2006/main" showMasterSp="0" showMasterPhAnim="0">
-  <p:cSld>
-    <p:spTree>
-      <p:nvGrpSpPr>
-        <p:cNvPr id="1" name="Shape 85"/>
-        <p:cNvGrpSpPr/>
-        <p:nvPr/>
-      </p:nvGrpSpPr>
-      <p:grpSpPr>
-        <a:xfrm>
-          <a:off x="0" y="0"/>
-          <a:ext cx="0" cy="0"/>
-          <a:chOff x="0" y="0"/>
-          <a:chExt cx="0" cy="0"/>
-        </a:xfrm>
-      </p:grpSpPr>
-      <p:sp>
-        <p:nvSpPr>
-          <p:cNvPr id="86" name="Google Shape;86;g22ea25fd1ab_0_81:notes"/>
-          <p:cNvSpPr>
-            <a:spLocks noGrp="1" noRot="1" noChangeAspect="1"/>
-          </p:cNvSpPr>
-          <p:nvPr>
-            <p:ph type="sldImg" idx="2"/>
-          </p:nvPr>
-        </p:nvSpPr>
-        <p:spPr>
-          <a:xfrm>
-            <a:off x="381000" y="685800"/>
-            <a:ext cx="6096000" cy="3429000"/>
-          </a:xfrm>
-          <a:custGeom>
-            <a:avLst/>
-            <a:gdLst/>
-            <a:ahLst/>
-            <a:cxnLst/>
-            <a:rect l="l" t="t" r="r" b="b"/>
-            <a:pathLst>
-              <a:path w="120000" h="120000" extrusionOk="0">
-                <a:moveTo>
-                  <a:pt x="0" y="0"/>
-                </a:moveTo>
-                <a:lnTo>
-                  <a:pt x="120000" y="0"/>
-                </a:lnTo>
-                <a:lnTo>
-                  <a:pt x="120000" y="120000"/>
-                </a:lnTo>
-                <a:lnTo>
-                  <a:pt x="0" y="120000"/>
-                </a:lnTo>
-                <a:close/>
-              </a:path>
-            </a:pathLst>
-          </a:custGeom>
-          <a:noFill/>
-          <a:ln w="9525" cap="flat" cmpd="sng">
-            <a:solidFill>
-              <a:srgbClr val="000000"/>
-            </a:solidFill>
-            <a:prstDash val="solid"/>
-            <a:round/>
-            <a:headEnd type="none" w="sm" len="sm"/>
-            <a:tailEnd type="none" w="sm" len="sm"/>
-          </a:ln>
-        </p:spPr>
-      </p:sp>
-      <p:sp>
-        <p:nvSpPr>
-          <p:cNvPr id="87" name="Google Shape;87;g22ea25fd1ab_0_81:notes"/>
-          <p:cNvSpPr txBox="1">
-            <a:spLocks noGrp="1"/>
-          </p:cNvSpPr>
-          <p:nvPr>
-            <p:ph type="body" idx="1"/>
-          </p:nvPr>
-        </p:nvSpPr>
-        <p:spPr>
-          <a:xfrm>
-            <a:off x="685800" y="4343400"/>
-            <a:ext cx="5486400" cy="4114800"/>
-          </a:xfrm>
-          <a:prstGeom prst="rect">
-            <a:avLst/>
-          </a:prstGeom>
-          <a:noFill/>
-          <a:ln>
-            <a:noFill/>
-          </a:ln>
-        </p:spPr>
-        <p:txBody>
-          <a:bodyPr spcFirstLastPara="1" wrap="square" lIns="91425" tIns="91425" rIns="91425" bIns="91425" anchor="t" anchorCtr="0">
-            <a:noAutofit/>
-          </a:bodyPr>
-          <a:lstStyle/>
-          <a:p>
-            <a:pPr marL="0" lvl="0" indent="0" algn="l" rtl="0">
-              <a:lnSpc>
-                <a:spcPct val="100000"/>
-              </a:lnSpc>
-              <a:spcBef>
-                <a:spcPts val="0"/>
-              </a:spcBef>
-              <a:spcAft>
-                <a:spcPts val="0"/>
-              </a:spcAft>
-              <a:buSzPts val="1100"/>
-              <a:buNone/>
-            </a:pPr>
-            <a:endParaRPr/>
-          </a:p>
-        </p:txBody>
-      </p:sp>
-    </p:spTree>
-  </p:cSld>
-  <p:clrMapOvr>
-    <a:masterClrMapping/>
-  </p:clrMapOvr>
-</p:notes>
-</file>
-
-<file path=ppt/notesSlides/notesSlide6.xml><?xml version="1.0" encoding="utf-8"?>
-<p:notes xmlns:a="http://schemas.openxmlformats.org/drawingml/2006/main" xmlns:r="http://schemas.openxmlformats.org/officeDocument/2006/relationships" xmlns:p="http://schemas.openxmlformats.org/presentationml/2006/main" showMasterSp="0" showMasterPhAnim="0">
-  <p:cSld>
-    <p:spTree>
-      <p:nvGrpSpPr>
-        <p:cNvPr id="1" name="Shape 93"/>
-        <p:cNvGrpSpPr/>
-        <p:nvPr/>
-      </p:nvGrpSpPr>
-      <p:grpSpPr>
-        <a:xfrm>
-          <a:off x="0" y="0"/>
-          <a:ext cx="0" cy="0"/>
-          <a:chOff x="0" y="0"/>
-          <a:chExt cx="0" cy="0"/>
-        </a:xfrm>
-      </p:grpSpPr>
-      <p:sp>
-        <p:nvSpPr>
-          <p:cNvPr id="94" name="Google Shape;94;g22ea25fd1ab_0_142:notes"/>
-          <p:cNvSpPr>
-            <a:spLocks noGrp="1" noRot="1" noChangeAspect="1"/>
-          </p:cNvSpPr>
-          <p:nvPr>
-            <p:ph type="sldImg" idx="2"/>
-          </p:nvPr>
-        </p:nvSpPr>
-        <p:spPr>
-          <a:xfrm>
-            <a:off x="381300" y="685800"/>
-            <a:ext cx="6096000" cy="3429000"/>
-          </a:xfrm>
-          <a:custGeom>
-            <a:avLst/>
-            <a:gdLst/>
-            <a:ahLst/>
-            <a:cxnLst/>
-            <a:rect l="l" t="t" r="r" b="b"/>
-            <a:pathLst>
-              <a:path w="120000" h="120000" extrusionOk="0">
-                <a:moveTo>
-                  <a:pt x="0" y="0"/>
-                </a:moveTo>
-                <a:lnTo>
-                  <a:pt x="120000" y="0"/>
-                </a:lnTo>
-                <a:lnTo>
-                  <a:pt x="120000" y="120000"/>
-                </a:lnTo>
-                <a:lnTo>
-                  <a:pt x="0" y="120000"/>
-                </a:lnTo>
-                <a:close/>
-              </a:path>
-            </a:pathLst>
-          </a:custGeom>
-        </p:spPr>
-      </p:sp>
-      <p:sp>
-        <p:nvSpPr>
-          <p:cNvPr id="95" name="Google Shape;95;g22ea25fd1ab_0_142:notes"/>
-          <p:cNvSpPr txBox="1">
-            <a:spLocks noGrp="1"/>
-          </p:cNvSpPr>
-          <p:nvPr>
-            <p:ph type="body" idx="1"/>
-          </p:nvPr>
-        </p:nvSpPr>
-        <p:spPr>
-          <a:xfrm>
-            <a:off x="685800" y="4343400"/>
-            <a:ext cx="5486400" cy="4114800"/>
-          </a:xfrm>
-          <a:prstGeom prst="rect">
-            <a:avLst/>
-          </a:prstGeom>
-        </p:spPr>
-        <p:txBody>
-          <a:bodyPr spcFirstLastPara="1" wrap="square" lIns="91425" tIns="91425" rIns="91425" bIns="91425" anchor="t" anchorCtr="0">
-            <a:noAutofit/>
-          </a:bodyPr>
-          <a:lstStyle/>
-          <a:p>
-            <a:pPr marL="0" lvl="0" indent="0" algn="l" rtl="0">
-              <a:spcBef>
-                <a:spcPts val="0"/>
-              </a:spcBef>
-              <a:spcAft>
-                <a:spcPts val="0"/>
-              </a:spcAft>
-              <a:buNone/>
-            </a:pPr>
-            <a:endParaRPr/>
-          </a:p>
-        </p:txBody>
-      </p:sp>
-    </p:spTree>
-  </p:cSld>
-  <p:clrMapOvr>
-    <a:masterClrMapping/>
-  </p:clrMapOvr>
-</p:notes>
-</file>
-
-<file path=ppt/notesSlides/notesSlide7.xml><?xml version="1.0" encoding="utf-8"?>
-<p:notes xmlns:a="http://schemas.openxmlformats.org/drawingml/2006/main" xmlns:r="http://schemas.openxmlformats.org/officeDocument/2006/relationships" xmlns:p="http://schemas.openxmlformats.org/presentationml/2006/main" showMasterSp="0" showMasterPhAnim="0">
-  <p:cSld>
-    <p:spTree>
-      <p:nvGrpSpPr>
-        <p:cNvPr id="1" name="Shape 102"/>
-        <p:cNvGrpSpPr/>
-        <p:nvPr/>
-      </p:nvGrpSpPr>
-      <p:grpSpPr>
-        <a:xfrm>
-          <a:off x="0" y="0"/>
-          <a:ext cx="0" cy="0"/>
-          <a:chOff x="0" y="0"/>
-          <a:chExt cx="0" cy="0"/>
-        </a:xfrm>
-      </p:grpSpPr>
-      <p:sp>
-        <p:nvSpPr>
-          <p:cNvPr id="103" name="Google Shape;103;g22ea25fd1ab_0_163:notes"/>
-          <p:cNvSpPr>
-            <a:spLocks noGrp="1" noRot="1" noChangeAspect="1"/>
-          </p:cNvSpPr>
-          <p:nvPr>
-            <p:ph type="sldImg" idx="2"/>
-          </p:nvPr>
-        </p:nvSpPr>
-        <p:spPr>
-          <a:xfrm>
-            <a:off x="381300" y="685800"/>
-            <a:ext cx="6096000" cy="3429000"/>
-          </a:xfrm>
-          <a:custGeom>
-            <a:avLst/>
-            <a:gdLst/>
-            <a:ahLst/>
-            <a:cxnLst/>
-            <a:rect l="l" t="t" r="r" b="b"/>
-            <a:pathLst>
-              <a:path w="120000" h="120000" extrusionOk="0">
-                <a:moveTo>
-                  <a:pt x="0" y="0"/>
-                </a:moveTo>
-                <a:lnTo>
-                  <a:pt x="120000" y="0"/>
-                </a:lnTo>
-                <a:lnTo>
-                  <a:pt x="120000" y="120000"/>
-                </a:lnTo>
-                <a:lnTo>
-                  <a:pt x="0" y="120000"/>
-                </a:lnTo>
-                <a:close/>
-              </a:path>
-            </a:pathLst>
-          </a:custGeom>
-        </p:spPr>
-      </p:sp>
-      <p:sp>
-        <p:nvSpPr>
-          <p:cNvPr id="104" name="Google Shape;104;g22ea25fd1ab_0_163:notes"/>
-          <p:cNvSpPr txBox="1">
-            <a:spLocks noGrp="1"/>
-          </p:cNvSpPr>
-          <p:nvPr>
-            <p:ph type="body" idx="1"/>
-          </p:nvPr>
-        </p:nvSpPr>
-        <p:spPr>
-          <a:xfrm>
-            <a:off x="685800" y="4343400"/>
-            <a:ext cx="5486400" cy="4114800"/>
-          </a:xfrm>
-          <a:prstGeom prst="rect">
-            <a:avLst/>
-          </a:prstGeom>
-        </p:spPr>
-        <p:txBody>
-          <a:bodyPr spcFirstLastPara="1" wrap="square" lIns="91425" tIns="91425" rIns="91425" bIns="91425" anchor="t" anchorCtr="0">
-            <a:noAutofit/>
-          </a:bodyPr>
-          <a:lstStyle/>
-          <a:p>
-            <a:pPr marL="0" lvl="0" indent="0" algn="l" rtl="0">
-              <a:spcBef>
-                <a:spcPts val="0"/>
-              </a:spcBef>
-              <a:spcAft>
-                <a:spcPts val="0"/>
-              </a:spcAft>
-              <a:buNone/>
-            </a:pPr>
-            <a:endParaRPr/>
-          </a:p>
-        </p:txBody>
-      </p:sp>
-    </p:spTree>
-  </p:cSld>
-  <p:clrMapOvr>
-    <a:masterClrMapping/>
-  </p:clrMapOvr>
-</p:notes>
-</file>
-
-<file path=ppt/notesSlides/notesSlide8.xml><?xml version="1.0" encoding="utf-8"?>
+<file path=ppt/notesSlides/notesSlide4.xml><?xml version="1.0" encoding="utf-8"?>
 <p:notes xmlns:a="http://schemas.openxmlformats.org/drawingml/2006/main" xmlns:r="http://schemas.openxmlformats.org/officeDocument/2006/relationships" xmlns:p="http://schemas.openxmlformats.org/presentationml/2006/main" showMasterSp="0" showMasterPhAnim="0">
   <p:cSld>
     <p:spTree>
@@ -2154,7 +1511,7 @@
 </p:notes>
 </file>
 
-<file path=ppt/notesSlides/notesSlide9.xml><?xml version="1.0" encoding="utf-8"?>
+<file path=ppt/notesSlides/notesSlide5.xml><?xml version="1.0" encoding="utf-8"?>
 <p:notes xmlns:a="http://schemas.openxmlformats.org/drawingml/2006/main" xmlns:r="http://schemas.openxmlformats.org/officeDocument/2006/relationships" xmlns:p="http://schemas.openxmlformats.org/presentationml/2006/main" showMasterSp="0" showMasterPhAnim="0">
   <p:cSld>
     <p:spTree>
@@ -2174,6 +1531,214 @@
       <p:sp>
         <p:nvSpPr>
           <p:cNvPr id="118" name="Google Shape;118;g258956bab95_0_0:notes"/>
+          <p:cNvSpPr>
+            <a:spLocks noGrp="1" noRot="1" noChangeAspect="1"/>
+          </p:cNvSpPr>
+          <p:nvPr>
+            <p:ph type="sldImg" idx="2"/>
+          </p:nvPr>
+        </p:nvSpPr>
+        <p:spPr>
+          <a:xfrm>
+            <a:off x="381000" y="685800"/>
+            <a:ext cx="6096000" cy="3429000"/>
+          </a:xfrm>
+          <a:custGeom>
+            <a:avLst/>
+            <a:gdLst/>
+            <a:ahLst/>
+            <a:cxnLst/>
+            <a:rect l="l" t="t" r="r" b="b"/>
+            <a:pathLst>
+              <a:path w="120000" h="120000" extrusionOk="0">
+                <a:moveTo>
+                  <a:pt x="0" y="0"/>
+                </a:moveTo>
+                <a:lnTo>
+                  <a:pt x="120000" y="0"/>
+                </a:lnTo>
+                <a:lnTo>
+                  <a:pt x="120000" y="120000"/>
+                </a:lnTo>
+                <a:lnTo>
+                  <a:pt x="0" y="120000"/>
+                </a:lnTo>
+                <a:close/>
+              </a:path>
+            </a:pathLst>
+          </a:custGeom>
+        </p:spPr>
+      </p:sp>
+      <p:sp>
+        <p:nvSpPr>
+          <p:cNvPr id="119" name="Google Shape;119;g258956bab95_0_0:notes"/>
+          <p:cNvSpPr txBox="1">
+            <a:spLocks noGrp="1"/>
+          </p:cNvSpPr>
+          <p:nvPr>
+            <p:ph type="body" idx="1"/>
+          </p:nvPr>
+        </p:nvSpPr>
+        <p:spPr>
+          <a:xfrm>
+            <a:off x="685800" y="4343400"/>
+            <a:ext cx="5486400" cy="4114800"/>
+          </a:xfrm>
+          <a:prstGeom prst="rect">
+            <a:avLst/>
+          </a:prstGeom>
+        </p:spPr>
+        <p:txBody>
+          <a:bodyPr spcFirstLastPara="1" wrap="square" lIns="91425" tIns="91425" rIns="91425" bIns="91425" anchor="t" anchorCtr="0">
+            <a:noAutofit/>
+          </a:bodyPr>
+          <a:lstStyle/>
+          <a:p>
+            <a:pPr marL="0" lvl="0" indent="0" algn="l" rtl="0">
+              <a:spcBef>
+                <a:spcPts val="0"/>
+              </a:spcBef>
+              <a:spcAft>
+                <a:spcPts val="0"/>
+              </a:spcAft>
+              <a:buNone/>
+            </a:pPr>
+            <a:endParaRPr/>
+          </a:p>
+        </p:txBody>
+      </p:sp>
+    </p:spTree>
+  </p:cSld>
+  <p:clrMapOvr>
+    <a:masterClrMapping/>
+  </p:clrMapOvr>
+</p:notes>
+</file>
+
+<file path=ppt/notesSlides/notesSlide6.xml><?xml version="1.0" encoding="utf-8"?>
+<p:notes xmlns:a="http://schemas.openxmlformats.org/drawingml/2006/main" xmlns:r="http://schemas.openxmlformats.org/officeDocument/2006/relationships" xmlns:p="http://schemas.openxmlformats.org/presentationml/2006/main" showMasterSp="0" showMasterPhAnim="0">
+  <p:cSld>
+    <p:spTree>
+      <p:nvGrpSpPr>
+        <p:cNvPr id="1" name="Shape 123"/>
+        <p:cNvGrpSpPr/>
+        <p:nvPr/>
+      </p:nvGrpSpPr>
+      <p:grpSpPr>
+        <a:xfrm>
+          <a:off x="0" y="0"/>
+          <a:ext cx="0" cy="0"/>
+          <a:chOff x="0" y="0"/>
+          <a:chExt cx="0" cy="0"/>
+        </a:xfrm>
+      </p:grpSpPr>
+      <p:sp>
+        <p:nvSpPr>
+          <p:cNvPr id="124" name="Google Shape;124;g258956bab95_0_5:notes"/>
+          <p:cNvSpPr>
+            <a:spLocks noGrp="1" noRot="1" noChangeAspect="1"/>
+          </p:cNvSpPr>
+          <p:nvPr>
+            <p:ph type="sldImg" idx="2"/>
+          </p:nvPr>
+        </p:nvSpPr>
+        <p:spPr>
+          <a:xfrm>
+            <a:off x="381000" y="685800"/>
+            <a:ext cx="6096000" cy="3429000"/>
+          </a:xfrm>
+          <a:custGeom>
+            <a:avLst/>
+            <a:gdLst/>
+            <a:ahLst/>
+            <a:cxnLst/>
+            <a:rect l="l" t="t" r="r" b="b"/>
+            <a:pathLst>
+              <a:path w="120000" h="120000" extrusionOk="0">
+                <a:moveTo>
+                  <a:pt x="0" y="0"/>
+                </a:moveTo>
+                <a:lnTo>
+                  <a:pt x="120000" y="0"/>
+                </a:lnTo>
+                <a:lnTo>
+                  <a:pt x="120000" y="120000"/>
+                </a:lnTo>
+                <a:lnTo>
+                  <a:pt x="0" y="120000"/>
+                </a:lnTo>
+                <a:close/>
+              </a:path>
+            </a:pathLst>
+          </a:custGeom>
+        </p:spPr>
+      </p:sp>
+      <p:sp>
+        <p:nvSpPr>
+          <p:cNvPr id="125" name="Google Shape;125;g258956bab95_0_5:notes"/>
+          <p:cNvSpPr txBox="1">
+            <a:spLocks noGrp="1"/>
+          </p:cNvSpPr>
+          <p:nvPr>
+            <p:ph type="body" idx="1"/>
+          </p:nvPr>
+        </p:nvSpPr>
+        <p:spPr>
+          <a:xfrm>
+            <a:off x="685800" y="4343400"/>
+            <a:ext cx="5486400" cy="4114800"/>
+          </a:xfrm>
+          <a:prstGeom prst="rect">
+            <a:avLst/>
+          </a:prstGeom>
+        </p:spPr>
+        <p:txBody>
+          <a:bodyPr spcFirstLastPara="1" wrap="square" lIns="91425" tIns="91425" rIns="91425" bIns="91425" anchor="t" anchorCtr="0">
+            <a:noAutofit/>
+          </a:bodyPr>
+          <a:lstStyle/>
+          <a:p>
+            <a:pPr marL="0" lvl="0" indent="0" algn="l" rtl="0">
+              <a:spcBef>
+                <a:spcPts val="0"/>
+              </a:spcBef>
+              <a:spcAft>
+                <a:spcPts val="0"/>
+              </a:spcAft>
+              <a:buNone/>
+            </a:pPr>
+            <a:endParaRPr/>
+          </a:p>
+        </p:txBody>
+      </p:sp>
+    </p:spTree>
+  </p:cSld>
+  <p:clrMapOvr>
+    <a:masterClrMapping/>
+  </p:clrMapOvr>
+</p:notes>
+</file>
+
+<file path=ppt/notesSlides/notesSlide7.xml><?xml version="1.0" encoding="utf-8"?>
+<p:notes xmlns:a="http://schemas.openxmlformats.org/drawingml/2006/main" xmlns:r="http://schemas.openxmlformats.org/officeDocument/2006/relationships" xmlns:p="http://schemas.openxmlformats.org/presentationml/2006/main" showMasterSp="0" showMasterPhAnim="0">
+  <p:cSld>
+    <p:spTree>
+      <p:nvGrpSpPr>
+        <p:cNvPr id="1" name="Shape 93"/>
+        <p:cNvGrpSpPr/>
+        <p:nvPr/>
+      </p:nvGrpSpPr>
+      <p:grpSpPr>
+        <a:xfrm>
+          <a:off x="0" y="0"/>
+          <a:ext cx="0" cy="0"/>
+          <a:chOff x="0" y="0"/>
+          <a:chExt cx="0" cy="0"/>
+        </a:xfrm>
+      </p:grpSpPr>
+      <p:sp>
+        <p:nvSpPr>
+          <p:cNvPr id="94" name="Google Shape;94;g22ea25fd1ab_0_142:notes"/>
           <p:cNvSpPr>
             <a:spLocks noGrp="1" noRot="1" noChangeAspect="1"/>
           </p:cNvSpPr>
@@ -2214,7 +1779,215 @@
       </p:sp>
       <p:sp>
         <p:nvSpPr>
-          <p:cNvPr id="119" name="Google Shape;119;g258956bab95_0_0:notes"/>
+          <p:cNvPr id="95" name="Google Shape;95;g22ea25fd1ab_0_142:notes"/>
+          <p:cNvSpPr txBox="1">
+            <a:spLocks noGrp="1"/>
+          </p:cNvSpPr>
+          <p:nvPr>
+            <p:ph type="body" idx="1"/>
+          </p:nvPr>
+        </p:nvSpPr>
+        <p:spPr>
+          <a:xfrm>
+            <a:off x="685800" y="4343400"/>
+            <a:ext cx="5486400" cy="4114800"/>
+          </a:xfrm>
+          <a:prstGeom prst="rect">
+            <a:avLst/>
+          </a:prstGeom>
+        </p:spPr>
+        <p:txBody>
+          <a:bodyPr spcFirstLastPara="1" wrap="square" lIns="91425" tIns="91425" rIns="91425" bIns="91425" anchor="t" anchorCtr="0">
+            <a:noAutofit/>
+          </a:bodyPr>
+          <a:lstStyle/>
+          <a:p>
+            <a:pPr marL="0" lvl="0" indent="0" algn="l" rtl="0">
+              <a:spcBef>
+                <a:spcPts val="0"/>
+              </a:spcBef>
+              <a:spcAft>
+                <a:spcPts val="0"/>
+              </a:spcAft>
+              <a:buNone/>
+            </a:pPr>
+            <a:endParaRPr/>
+          </a:p>
+        </p:txBody>
+      </p:sp>
+    </p:spTree>
+  </p:cSld>
+  <p:clrMapOvr>
+    <a:masterClrMapping/>
+  </p:clrMapOvr>
+</p:notes>
+</file>
+
+<file path=ppt/notesSlides/notesSlide8.xml><?xml version="1.0" encoding="utf-8"?>
+<p:notes xmlns:a="http://schemas.openxmlformats.org/drawingml/2006/main" xmlns:r="http://schemas.openxmlformats.org/officeDocument/2006/relationships" xmlns:p="http://schemas.openxmlformats.org/presentationml/2006/main" showMasterSp="0" showMasterPhAnim="0">
+  <p:cSld>
+    <p:spTree>
+      <p:nvGrpSpPr>
+        <p:cNvPr id="1" name="Shape 102"/>
+        <p:cNvGrpSpPr/>
+        <p:nvPr/>
+      </p:nvGrpSpPr>
+      <p:grpSpPr>
+        <a:xfrm>
+          <a:off x="0" y="0"/>
+          <a:ext cx="0" cy="0"/>
+          <a:chOff x="0" y="0"/>
+          <a:chExt cx="0" cy="0"/>
+        </a:xfrm>
+      </p:grpSpPr>
+      <p:sp>
+        <p:nvSpPr>
+          <p:cNvPr id="103" name="Google Shape;103;g22ea25fd1ab_0_163:notes"/>
+          <p:cNvSpPr>
+            <a:spLocks noGrp="1" noRot="1" noChangeAspect="1"/>
+          </p:cNvSpPr>
+          <p:nvPr>
+            <p:ph type="sldImg" idx="2"/>
+          </p:nvPr>
+        </p:nvSpPr>
+        <p:spPr>
+          <a:xfrm>
+            <a:off x="381300" y="685800"/>
+            <a:ext cx="6096000" cy="3429000"/>
+          </a:xfrm>
+          <a:custGeom>
+            <a:avLst/>
+            <a:gdLst/>
+            <a:ahLst/>
+            <a:cxnLst/>
+            <a:rect l="l" t="t" r="r" b="b"/>
+            <a:pathLst>
+              <a:path w="120000" h="120000" extrusionOk="0">
+                <a:moveTo>
+                  <a:pt x="0" y="0"/>
+                </a:moveTo>
+                <a:lnTo>
+                  <a:pt x="120000" y="0"/>
+                </a:lnTo>
+                <a:lnTo>
+                  <a:pt x="120000" y="120000"/>
+                </a:lnTo>
+                <a:lnTo>
+                  <a:pt x="0" y="120000"/>
+                </a:lnTo>
+                <a:close/>
+              </a:path>
+            </a:pathLst>
+          </a:custGeom>
+        </p:spPr>
+      </p:sp>
+      <p:sp>
+        <p:nvSpPr>
+          <p:cNvPr id="104" name="Google Shape;104;g22ea25fd1ab_0_163:notes"/>
+          <p:cNvSpPr txBox="1">
+            <a:spLocks noGrp="1"/>
+          </p:cNvSpPr>
+          <p:nvPr>
+            <p:ph type="body" idx="1"/>
+          </p:nvPr>
+        </p:nvSpPr>
+        <p:spPr>
+          <a:xfrm>
+            <a:off x="685800" y="4343400"/>
+            <a:ext cx="5486400" cy="4114800"/>
+          </a:xfrm>
+          <a:prstGeom prst="rect">
+            <a:avLst/>
+          </a:prstGeom>
+        </p:spPr>
+        <p:txBody>
+          <a:bodyPr spcFirstLastPara="1" wrap="square" lIns="91425" tIns="91425" rIns="91425" bIns="91425" anchor="t" anchorCtr="0">
+            <a:noAutofit/>
+          </a:bodyPr>
+          <a:lstStyle/>
+          <a:p>
+            <a:pPr marL="0" lvl="0" indent="0" algn="l" rtl="0">
+              <a:spcBef>
+                <a:spcPts val="0"/>
+              </a:spcBef>
+              <a:spcAft>
+                <a:spcPts val="0"/>
+              </a:spcAft>
+              <a:buNone/>
+            </a:pPr>
+            <a:endParaRPr/>
+          </a:p>
+        </p:txBody>
+      </p:sp>
+    </p:spTree>
+  </p:cSld>
+  <p:clrMapOvr>
+    <a:masterClrMapping/>
+  </p:clrMapOvr>
+</p:notes>
+</file>
+
+<file path=ppt/notesSlides/notesSlide9.xml><?xml version="1.0" encoding="utf-8"?>
+<p:notes xmlns:a="http://schemas.openxmlformats.org/drawingml/2006/main" xmlns:r="http://schemas.openxmlformats.org/officeDocument/2006/relationships" xmlns:p="http://schemas.openxmlformats.org/presentationml/2006/main" showMasterSp="0" showMasterPhAnim="0">
+  <p:cSld>
+    <p:spTree>
+      <p:nvGrpSpPr>
+        <p:cNvPr id="1" name="Shape 130"/>
+        <p:cNvGrpSpPr/>
+        <p:nvPr/>
+      </p:nvGrpSpPr>
+      <p:grpSpPr>
+        <a:xfrm>
+          <a:off x="0" y="0"/>
+          <a:ext cx="0" cy="0"/>
+          <a:chOff x="0" y="0"/>
+          <a:chExt cx="0" cy="0"/>
+        </a:xfrm>
+      </p:grpSpPr>
+      <p:sp>
+        <p:nvSpPr>
+          <p:cNvPr id="131" name="Google Shape;131;g22ea25fd1ab_0_152:notes"/>
+          <p:cNvSpPr>
+            <a:spLocks noGrp="1" noRot="1" noChangeAspect="1"/>
+          </p:cNvSpPr>
+          <p:nvPr>
+            <p:ph type="sldImg" idx="2"/>
+          </p:nvPr>
+        </p:nvSpPr>
+        <p:spPr>
+          <a:xfrm>
+            <a:off x="381000" y="685800"/>
+            <a:ext cx="6096000" cy="3429000"/>
+          </a:xfrm>
+          <a:custGeom>
+            <a:avLst/>
+            <a:gdLst/>
+            <a:ahLst/>
+            <a:cxnLst/>
+            <a:rect l="l" t="t" r="r" b="b"/>
+            <a:pathLst>
+              <a:path w="120000" h="120000" extrusionOk="0">
+                <a:moveTo>
+                  <a:pt x="0" y="0"/>
+                </a:moveTo>
+                <a:lnTo>
+                  <a:pt x="120000" y="0"/>
+                </a:lnTo>
+                <a:lnTo>
+                  <a:pt x="120000" y="120000"/>
+                </a:lnTo>
+                <a:lnTo>
+                  <a:pt x="0" y="120000"/>
+                </a:lnTo>
+                <a:close/>
+              </a:path>
+            </a:pathLst>
+          </a:custGeom>
+        </p:spPr>
+      </p:sp>
+      <p:sp>
+        <p:nvSpPr>
+          <p:cNvPr id="132" name="Google Shape;132;g22ea25fd1ab_0_152:notes"/>
           <p:cNvSpPr txBox="1">
             <a:spLocks noGrp="1"/>
           </p:cNvSpPr>
@@ -7137,12 +6910,8 @@
               <a:buNone/>
             </a:pPr>
             <a:r>
-              <a:rPr lang="en" sz="2500" dirty="0"/>
-              <a:t>Rutendo </a:t>
-            </a:r>
-            <a:r>
-              <a:rPr lang="en" sz="2500" dirty="0" err="1"/>
-              <a:t>Sigauke</a:t>
+              <a:rPr lang="en-US" sz="2500" dirty="0"/>
+              <a:t>Sam Hunter</a:t>
             </a:r>
             <a:endParaRPr sz="2500" dirty="0"/>
           </a:p>
@@ -7162,7 +6931,7 @@
             </a:pPr>
             <a:r>
               <a:rPr lang="en" sz="2500" dirty="0"/>
-              <a:t>2023</a:t>
+              <a:t>2024</a:t>
             </a:r>
             <a:endParaRPr sz="2500" dirty="0"/>
           </a:p>
@@ -7177,226 +6946,6 @@
 </file>
 
 <file path=ppt/slides/slide10.xml><?xml version="1.0" encoding="utf-8"?>
-<p:sld xmlns:a="http://schemas.openxmlformats.org/drawingml/2006/main" xmlns:r="http://schemas.openxmlformats.org/officeDocument/2006/relationships" xmlns:p="http://schemas.openxmlformats.org/presentationml/2006/main">
-  <p:cSld>
-    <p:spTree>
-      <p:nvGrpSpPr>
-        <p:cNvPr id="1" name="Shape 126"/>
-        <p:cNvGrpSpPr/>
-        <p:nvPr/>
-      </p:nvGrpSpPr>
-      <p:grpSpPr>
-        <a:xfrm>
-          <a:off x="0" y="0"/>
-          <a:ext cx="0" cy="0"/>
-          <a:chOff x="0" y="0"/>
-          <a:chExt cx="0" cy="0"/>
-        </a:xfrm>
-      </p:grpSpPr>
-      <p:sp>
-        <p:nvSpPr>
-          <p:cNvPr id="127" name="Google Shape;127;p22"/>
-          <p:cNvSpPr txBox="1">
-            <a:spLocks noGrp="1"/>
-          </p:cNvSpPr>
-          <p:nvPr>
-            <p:ph type="title"/>
-          </p:nvPr>
-        </p:nvSpPr>
-        <p:spPr>
-          <a:xfrm>
-            <a:off x="311700" y="445025"/>
-            <a:ext cx="8520600" cy="572700"/>
-          </a:xfrm>
-          <a:prstGeom prst="rect">
-            <a:avLst/>
-          </a:prstGeom>
-        </p:spPr>
-        <p:txBody>
-          <a:bodyPr spcFirstLastPara="1" wrap="square" lIns="91425" tIns="91425" rIns="91425" bIns="91425" anchor="t" anchorCtr="0">
-            <a:normAutofit fontScale="90000"/>
-          </a:bodyPr>
-          <a:lstStyle/>
-          <a:p>
-            <a:pPr marL="0" lvl="0" indent="0" algn="ctr" rtl="0">
-              <a:spcBef>
-                <a:spcPts val="0"/>
-              </a:spcBef>
-              <a:spcAft>
-                <a:spcPts val="0"/>
-              </a:spcAft>
-              <a:buNone/>
-            </a:pPr>
-            <a:r>
-              <a:rPr lang="en"/>
-              <a:t>Challenge Question</a:t>
-            </a:r>
-            <a:endParaRPr/>
-          </a:p>
-        </p:txBody>
-      </p:sp>
-      <p:sp>
-        <p:nvSpPr>
-          <p:cNvPr id="128" name="Google Shape;128;p22"/>
-          <p:cNvSpPr txBox="1">
-            <a:spLocks noGrp="1"/>
-          </p:cNvSpPr>
-          <p:nvPr>
-            <p:ph type="body" idx="1"/>
-          </p:nvPr>
-        </p:nvSpPr>
-        <p:spPr>
-          <a:xfrm>
-            <a:off x="311700" y="1152475"/>
-            <a:ext cx="8520600" cy="3416400"/>
-          </a:xfrm>
-          <a:prstGeom prst="rect">
-            <a:avLst/>
-          </a:prstGeom>
-        </p:spPr>
-        <p:txBody>
-          <a:bodyPr spcFirstLastPara="1" wrap="square" lIns="91425" tIns="91425" rIns="91425" bIns="91425" anchor="t" anchorCtr="0">
-            <a:normAutofit/>
-          </a:bodyPr>
-          <a:lstStyle/>
-          <a:p>
-            <a:pPr marL="457200" lvl="0" indent="-355600" algn="l" rtl="0">
-              <a:spcBef>
-                <a:spcPts val="0"/>
-              </a:spcBef>
-              <a:spcAft>
-                <a:spcPts val="0"/>
-              </a:spcAft>
-              <a:buSzPts val="2000"/>
-              <a:buChar char="●"/>
-            </a:pPr>
-            <a:r>
-              <a:rPr lang="en" sz="2000" dirty="0"/>
-              <a:t>What feature would you used to count reads for RNA-seq?</a:t>
-            </a:r>
-            <a:endParaRPr sz="2000" dirty="0"/>
-          </a:p>
-          <a:p>
-            <a:pPr marL="457200" lvl="0" indent="-355600" algn="l" rtl="0">
-              <a:lnSpc>
-                <a:spcPct val="150000"/>
-              </a:lnSpc>
-              <a:spcBef>
-                <a:spcPts val="0"/>
-              </a:spcBef>
-              <a:spcAft>
-                <a:spcPts val="0"/>
-              </a:spcAft>
-              <a:buSzPts val="2000"/>
-              <a:buAutoNum type="alphaUcPeriod"/>
-            </a:pPr>
-            <a:r>
-              <a:rPr lang="en" sz="2000" dirty="0"/>
-              <a:t>Gene</a:t>
-            </a:r>
-            <a:endParaRPr sz="2000" dirty="0"/>
-          </a:p>
-          <a:p>
-            <a:pPr marL="457200" lvl="0" indent="-355600" algn="l" rtl="0">
-              <a:lnSpc>
-                <a:spcPct val="150000"/>
-              </a:lnSpc>
-              <a:spcBef>
-                <a:spcPts val="0"/>
-              </a:spcBef>
-              <a:spcAft>
-                <a:spcPts val="0"/>
-              </a:spcAft>
-              <a:buSzPts val="2000"/>
-              <a:buAutoNum type="alphaUcPeriod"/>
-            </a:pPr>
-            <a:r>
-              <a:rPr lang="en" sz="2000" dirty="0"/>
-              <a:t>Exon</a:t>
-            </a:r>
-            <a:endParaRPr sz="2000" dirty="0"/>
-          </a:p>
-          <a:p>
-            <a:pPr marL="457200" lvl="0" indent="-355600" algn="l" rtl="0">
-              <a:lnSpc>
-                <a:spcPct val="150000"/>
-              </a:lnSpc>
-              <a:spcBef>
-                <a:spcPts val="0"/>
-              </a:spcBef>
-              <a:spcAft>
-                <a:spcPts val="0"/>
-              </a:spcAft>
-              <a:buSzPts val="2000"/>
-              <a:buAutoNum type="alphaUcPeriod"/>
-            </a:pPr>
-            <a:r>
-              <a:rPr lang="en" sz="2000" dirty="0"/>
-              <a:t>Transcripts</a:t>
-            </a:r>
-            <a:endParaRPr sz="2000" dirty="0"/>
-          </a:p>
-        </p:txBody>
-      </p:sp>
-      <p:sp>
-        <p:nvSpPr>
-          <p:cNvPr id="129" name="Google Shape;129;p22"/>
-          <p:cNvSpPr txBox="1"/>
-          <p:nvPr/>
-        </p:nvSpPr>
-        <p:spPr>
-          <a:xfrm>
-            <a:off x="1619663" y="1980362"/>
-            <a:ext cx="579900" cy="431100"/>
-          </a:xfrm>
-          <a:prstGeom prst="rect">
-            <a:avLst/>
-          </a:prstGeom>
-          <a:noFill/>
-          <a:ln>
-            <a:noFill/>
-          </a:ln>
-        </p:spPr>
-        <p:txBody>
-          <a:bodyPr spcFirstLastPara="1" wrap="square" lIns="91425" tIns="91425" rIns="91425" bIns="91425" anchor="t" anchorCtr="0">
-            <a:spAutoFit/>
-          </a:bodyPr>
-          <a:lstStyle/>
-          <a:p>
-            <a:pPr marL="0" lvl="0" indent="0" algn="l" rtl="0">
-              <a:spcBef>
-                <a:spcPts val="0"/>
-              </a:spcBef>
-              <a:spcAft>
-                <a:spcPts val="0"/>
-              </a:spcAft>
-              <a:buNone/>
-            </a:pPr>
-            <a:r>
-              <a:rPr lang="en" sz="1600">
-                <a:solidFill>
-                  <a:srgbClr val="1155CC"/>
-                </a:solidFill>
-              </a:rPr>
-              <a:t>✓</a:t>
-            </a:r>
-            <a:endParaRPr sz="1600">
-              <a:solidFill>
-                <a:srgbClr val="1155CC"/>
-              </a:solidFill>
-            </a:endParaRPr>
-          </a:p>
-        </p:txBody>
-      </p:sp>
-    </p:spTree>
-  </p:cSld>
-  <p:clrMapOvr>
-    <a:masterClrMapping/>
-  </p:clrMapOvr>
-</p:sld>
-</file>
-
-<file path=ppt/slides/slide11.xml><?xml version="1.0" encoding="utf-8"?>
 <p:sld xmlns:a="http://schemas.openxmlformats.org/drawingml/2006/main" xmlns:r="http://schemas.openxmlformats.org/officeDocument/2006/relationships" xmlns:p="http://schemas.openxmlformats.org/presentationml/2006/main">
   <p:cSld>
     <p:spTree>
@@ -7569,7 +7118,7 @@
 </p:sld>
 </file>
 
-<file path=ppt/slides/slide12.xml><?xml version="1.0" encoding="utf-8"?>
+<file path=ppt/slides/slide11.xml><?xml version="1.0" encoding="utf-8"?>
 <p:sld xmlns:a="http://schemas.openxmlformats.org/drawingml/2006/main" xmlns:r="http://schemas.openxmlformats.org/officeDocument/2006/relationships" xmlns:p="http://schemas.openxmlformats.org/presentationml/2006/main">
   <p:cSld>
     <p:spTree>
@@ -7679,7 +7228,7 @@
 </p:sld>
 </file>
 
-<file path=ppt/slides/slide13.xml><?xml version="1.0" encoding="utf-8"?>
+<file path=ppt/slides/slide12.xml><?xml version="1.0" encoding="utf-8"?>
 <p:sld xmlns:a="http://schemas.openxmlformats.org/drawingml/2006/main" xmlns:r="http://schemas.openxmlformats.org/officeDocument/2006/relationships" xmlns:p="http://schemas.openxmlformats.org/presentationml/2006/main">
   <p:cSld>
     <p:spTree>
@@ -7860,7 +7409,7 @@
 </p:sld>
 </file>
 
-<file path=ppt/slides/slide14.xml><?xml version="1.0" encoding="utf-8"?>
+<file path=ppt/slides/slide13.xml><?xml version="1.0" encoding="utf-8"?>
 <p:sld xmlns:a="http://schemas.openxmlformats.org/drawingml/2006/main" xmlns:r="http://schemas.openxmlformats.org/officeDocument/2006/relationships" xmlns:p="http://schemas.openxmlformats.org/presentationml/2006/main">
   <p:cSld>
     <p:spTree>
@@ -8033,7 +7582,7 @@
   <p:cSld>
     <p:spTree>
       <p:nvGrpSpPr>
-        <p:cNvPr id="1" name="Shape 59"/>
+        <p:cNvPr id="1" name=""/>
         <p:cNvGrpSpPr/>
         <p:nvPr/>
       </p:nvGrpSpPr>
@@ -8047,8 +7596,14 @@
       </p:grpSpPr>
       <p:sp>
         <p:nvSpPr>
-          <p:cNvPr id="60" name="Google Shape;60;p14"/>
-          <p:cNvSpPr txBox="1">
+          <p:cNvPr id="2" name="Title 1">
+            <a:extLst>
+              <a:ext uri="{FF2B5EF4-FFF2-40B4-BE49-F238E27FC236}">
+                <a16:creationId xmlns:a16="http://schemas.microsoft.com/office/drawing/2014/main" id="{FFB4CB10-AEB1-BDC9-B7B2-2E0E69A09DD2}"/>
+              </a:ext>
+            </a:extLst>
+          </p:cNvPr>
+          <p:cNvSpPr>
             <a:spLocks noGrp="1"/>
           </p:cNvSpPr>
           <p:nvPr>
@@ -8057,150 +7612,289 @@
         </p:nvSpPr>
         <p:spPr>
           <a:xfrm>
-            <a:off x="311700" y="445025"/>
-            <a:ext cx="8520600" cy="572700"/>
+            <a:off x="245198" y="430115"/>
+            <a:ext cx="8520600" cy="841800"/>
           </a:xfrm>
-          <a:prstGeom prst="rect">
-            <a:avLst/>
-          </a:prstGeom>
         </p:spPr>
         <p:txBody>
-          <a:bodyPr spcFirstLastPara="1" wrap="square" lIns="91425" tIns="91425" rIns="91425" bIns="91425" anchor="t" anchorCtr="0">
+          <a:bodyPr>
             <a:normAutofit fontScale="90000"/>
           </a:bodyPr>
           <a:lstStyle/>
           <a:p>
-            <a:pPr marL="0" lvl="0" indent="0" algn="ctr" rtl="0">
-              <a:spcBef>
-                <a:spcPts val="0"/>
-              </a:spcBef>
-              <a:spcAft>
-                <a:spcPts val="0"/>
-              </a:spcAft>
-              <a:buNone/>
-            </a:pPr>
-            <a:r>
-              <a:rPr lang="en" dirty="0"/>
-              <a:t>Day 7 Overview</a:t>
-            </a:r>
-            <a:endParaRPr dirty="0"/>
+            <a:r>
+              <a:rPr lang="en-US" dirty="0"/>
+              <a:t>Project B: Identification of the p53 transcriptional program using RNA-seq and </a:t>
+            </a:r>
+            <a:r>
+              <a:rPr lang="en-US" dirty="0" err="1"/>
+              <a:t>ChIP</a:t>
+            </a:r>
+            <a:r>
+              <a:rPr lang="en-US" dirty="0"/>
+              <a:t>-seq</a:t>
+            </a:r>
           </a:p>
         </p:txBody>
       </p:sp>
+      <p:grpSp>
+        <p:nvGrpSpPr>
+          <p:cNvPr id="4" name="Group 3">
+            <a:extLst>
+              <a:ext uri="{FF2B5EF4-FFF2-40B4-BE49-F238E27FC236}">
+                <a16:creationId xmlns:a16="http://schemas.microsoft.com/office/drawing/2014/main" id="{D40CBB9A-C63B-B7B6-875F-304E2909A376}"/>
+              </a:ext>
+            </a:extLst>
+          </p:cNvPr>
+          <p:cNvGrpSpPr/>
+          <p:nvPr/>
+        </p:nvGrpSpPr>
+        <p:grpSpPr>
+          <a:xfrm>
+            <a:off x="0" y="1870364"/>
+            <a:ext cx="8858737" cy="1656447"/>
+            <a:chOff x="0" y="2036619"/>
+            <a:chExt cx="8858737" cy="1656447"/>
+          </a:xfrm>
+        </p:grpSpPr>
+        <p:pic>
+          <p:nvPicPr>
+            <p:cNvPr id="1026" name="Picture 2">
+              <a:extLst>
+                <a:ext uri="{FF2B5EF4-FFF2-40B4-BE49-F238E27FC236}">
+                  <a16:creationId xmlns:a16="http://schemas.microsoft.com/office/drawing/2014/main" id="{FAE80159-FF8C-E08C-0A22-5FB9C46FA654}"/>
+                </a:ext>
+              </a:extLst>
+            </p:cNvPr>
+            <p:cNvPicPr>
+              <a:picLocks noChangeAspect="1" noChangeArrowheads="1"/>
+            </p:cNvPicPr>
+            <p:nvPr/>
+          </p:nvPicPr>
+          <p:blipFill rotWithShape="1">
+            <a:blip r:embed="rId2">
+              <a:extLst>
+                <a:ext uri="{28A0092B-C50C-407E-A947-70E740481C1C}">
+                  <a14:useLocalDpi xmlns:a14="http://schemas.microsoft.com/office/drawing/2010/main" val="0"/>
+                </a:ext>
+              </a:extLst>
+            </a:blip>
+            <a:srcRect b="90758"/>
+            <a:stretch/>
+          </p:blipFill>
+          <p:spPr bwMode="auto">
+            <a:xfrm>
+              <a:off x="0" y="2036619"/>
+              <a:ext cx="8858737" cy="841800"/>
+            </a:xfrm>
+            <a:prstGeom prst="rect">
+              <a:avLst/>
+            </a:prstGeom>
+            <a:noFill/>
+            <a:extLst>
+              <a:ext uri="{909E8E84-426E-40DD-AFC4-6F175D3DCCD1}">
+                <a14:hiddenFill xmlns:a14="http://schemas.microsoft.com/office/drawing/2010/main">
+                  <a:solidFill>
+                    <a:srgbClr val="FFFFFF"/>
+                  </a:solidFill>
+                </a14:hiddenFill>
+              </a:ext>
+            </a:extLst>
+          </p:spPr>
+        </p:pic>
+        <p:pic>
+          <p:nvPicPr>
+            <p:cNvPr id="3" name="Picture 2">
+              <a:extLst>
+                <a:ext uri="{FF2B5EF4-FFF2-40B4-BE49-F238E27FC236}">
+                  <a16:creationId xmlns:a16="http://schemas.microsoft.com/office/drawing/2014/main" id="{3D873257-F0C4-1869-B569-3FD873586DA7}"/>
+                </a:ext>
+              </a:extLst>
+            </p:cNvPr>
+            <p:cNvPicPr>
+              <a:picLocks noChangeAspect="1" noChangeArrowheads="1"/>
+            </p:cNvPicPr>
+            <p:nvPr/>
+          </p:nvPicPr>
+          <p:blipFill rotWithShape="1">
+            <a:blip r:embed="rId2">
+              <a:extLst>
+                <a:ext uri="{28A0092B-C50C-407E-A947-70E740481C1C}">
+                  <a14:useLocalDpi xmlns:a14="http://schemas.microsoft.com/office/drawing/2010/main" val="0"/>
+                </a:ext>
+              </a:extLst>
+            </a:blip>
+            <a:srcRect t="17903" b="72855"/>
+            <a:stretch/>
+          </p:blipFill>
+          <p:spPr bwMode="auto">
+            <a:xfrm>
+              <a:off x="0" y="2851266"/>
+              <a:ext cx="8858737" cy="841800"/>
+            </a:xfrm>
+            <a:prstGeom prst="rect">
+              <a:avLst/>
+            </a:prstGeom>
+            <a:noFill/>
+            <a:extLst>
+              <a:ext uri="{909E8E84-426E-40DD-AFC4-6F175D3DCCD1}">
+                <a14:hiddenFill xmlns:a14="http://schemas.microsoft.com/office/drawing/2010/main">
+                  <a:solidFill>
+                    <a:srgbClr val="FFFFFF"/>
+                  </a:solidFill>
+                </a14:hiddenFill>
+              </a:ext>
+            </a:extLst>
+          </p:spPr>
+        </p:pic>
+      </p:grpSp>
       <p:sp>
         <p:nvSpPr>
-          <p:cNvPr id="61" name="Google Shape;61;p14"/>
-          <p:cNvSpPr txBox="1">
-            <a:spLocks noGrp="1"/>
-          </p:cNvSpPr>
-          <p:nvPr>
-            <p:ph type="body" idx="1"/>
-          </p:nvPr>
+          <p:cNvPr id="5" name="TextBox 4">
+            <a:extLst>
+              <a:ext uri="{FF2B5EF4-FFF2-40B4-BE49-F238E27FC236}">
+                <a16:creationId xmlns:a16="http://schemas.microsoft.com/office/drawing/2014/main" id="{FE123C82-2180-566D-2F97-B6D4AA476C11}"/>
+              </a:ext>
+            </a:extLst>
+          </p:cNvPr>
+          <p:cNvSpPr txBox="1"/>
+          <p:nvPr/>
         </p:nvSpPr>
         <p:spPr>
           <a:xfrm>
-            <a:off x="735375" y="1996700"/>
-            <a:ext cx="2789700" cy="1364100"/>
-          </a:xfrm>
-          <a:prstGeom prst="rect">
-            <a:avLst/>
-          </a:prstGeom>
-        </p:spPr>
-        <p:txBody>
-          <a:bodyPr spcFirstLastPara="1" wrap="square" lIns="91425" tIns="91425" rIns="91425" bIns="91425" anchor="t" anchorCtr="0">
-            <a:normAutofit lnSpcReduction="10000"/>
-          </a:bodyPr>
-          <a:lstStyle/>
-          <a:p>
-            <a:pPr marL="457200" lvl="0" indent="-355600" algn="l" rtl="0">
-              <a:lnSpc>
-                <a:spcPct val="150000"/>
-              </a:lnSpc>
-              <a:spcBef>
-                <a:spcPts val="0"/>
-              </a:spcBef>
-              <a:spcAft>
-                <a:spcPts val="0"/>
-              </a:spcAft>
-              <a:buSzPts val="2000"/>
-              <a:buChar char="●"/>
-            </a:pPr>
-            <a:r>
-              <a:rPr lang="en" sz="2000" dirty="0"/>
-              <a:t>M&amp;Ms</a:t>
-            </a:r>
-            <a:endParaRPr sz="2000" dirty="0"/>
-          </a:p>
-          <a:p>
-            <a:pPr marL="457200" lvl="0" indent="-355600" algn="l" rtl="0">
-              <a:lnSpc>
-                <a:spcPct val="150000"/>
-              </a:lnSpc>
-              <a:spcBef>
-                <a:spcPts val="0"/>
-              </a:spcBef>
-              <a:spcAft>
-                <a:spcPts val="0"/>
-              </a:spcAft>
-              <a:buSzPts val="2000"/>
-              <a:buChar char="●"/>
-            </a:pPr>
-            <a:r>
-              <a:rPr lang="en" sz="2000" dirty="0" err="1"/>
-              <a:t>featureCounts</a:t>
-            </a:r>
-            <a:endParaRPr sz="2000" dirty="0"/>
-          </a:p>
-          <a:p>
-            <a:pPr marL="457200" lvl="0" indent="-355600" algn="l" rtl="0">
-              <a:lnSpc>
-                <a:spcPct val="150000"/>
-              </a:lnSpc>
-              <a:spcBef>
-                <a:spcPts val="0"/>
-              </a:spcBef>
-              <a:spcAft>
-                <a:spcPts val="0"/>
-              </a:spcAft>
-              <a:buSzPts val="2000"/>
-              <a:buChar char="●"/>
-            </a:pPr>
-            <a:r>
-              <a:rPr lang="en" sz="2000" dirty="0"/>
-              <a:t>DESeq2</a:t>
-            </a:r>
-            <a:endParaRPr sz="2000" dirty="0"/>
-          </a:p>
-        </p:txBody>
-      </p:sp>
-      <p:pic>
-        <p:nvPicPr>
-          <p:cNvPr id="62" name="Google Shape;62;p14"/>
-          <p:cNvPicPr preferRelativeResize="0"/>
-          <p:nvPr/>
-        </p:nvPicPr>
-        <p:blipFill rotWithShape="1">
-          <a:blip r:embed="rId3">
-            <a:alphaModFix/>
-          </a:blip>
-          <a:srcRect/>
-          <a:stretch/>
-        </p:blipFill>
-        <p:spPr>
-          <a:xfrm>
-            <a:off x="4753526" y="1152468"/>
-            <a:ext cx="4023971" cy="3052559"/>
+            <a:off x="5477683" y="3719987"/>
+            <a:ext cx="3381054" cy="307777"/>
           </a:xfrm>
           <a:prstGeom prst="rect">
             <a:avLst/>
           </a:prstGeom>
           <a:noFill/>
-          <a:ln>
-            <a:noFill/>
-          </a:ln>
         </p:spPr>
-      </p:pic>
+        <p:txBody>
+          <a:bodyPr wrap="none" rtlCol="0">
+            <a:spAutoFit/>
+          </a:bodyPr>
+          <a:lstStyle/>
+          <a:p>
+            <a:r>
+              <a:rPr lang="en-US" dirty="0"/>
+              <a:t>In HCT116, SJSA, and MCF7 cell types.</a:t>
+            </a:r>
+          </a:p>
+        </p:txBody>
+      </p:sp>
+      <p:sp>
+        <p:nvSpPr>
+          <p:cNvPr id="6" name="TextBox 5">
+            <a:extLst>
+              <a:ext uri="{FF2B5EF4-FFF2-40B4-BE49-F238E27FC236}">
+                <a16:creationId xmlns:a16="http://schemas.microsoft.com/office/drawing/2014/main" id="{4BE76E43-25DB-B665-7FB4-B31850DA9CA9}"/>
+              </a:ext>
+            </a:extLst>
+          </p:cNvPr>
+          <p:cNvSpPr txBox="1"/>
+          <p:nvPr/>
+        </p:nvSpPr>
+        <p:spPr>
+          <a:xfrm>
+            <a:off x="1780210" y="4528719"/>
+            <a:ext cx="5583580" cy="369332"/>
+          </a:xfrm>
+          <a:prstGeom prst="rect">
+            <a:avLst/>
+          </a:prstGeom>
+          <a:noFill/>
+        </p:spPr>
+        <p:txBody>
+          <a:bodyPr wrap="none" rtlCol="0">
+            <a:spAutoFit/>
+          </a:bodyPr>
+          <a:lstStyle/>
+          <a:p>
+            <a:r>
+              <a:rPr lang="en-US" sz="1800" dirty="0"/>
+              <a:t>Question: Which genes are driven by p53 activation?</a:t>
+            </a:r>
+          </a:p>
+        </p:txBody>
+      </p:sp>
+      <p:sp>
+        <p:nvSpPr>
+          <p:cNvPr id="7" name="TextBox 6">
+            <a:extLst>
+              <a:ext uri="{FF2B5EF4-FFF2-40B4-BE49-F238E27FC236}">
+                <a16:creationId xmlns:a16="http://schemas.microsoft.com/office/drawing/2014/main" id="{00807CE2-AB1B-912E-3CD0-D47CD33D54EC}"/>
+              </a:ext>
+            </a:extLst>
+          </p:cNvPr>
+          <p:cNvSpPr txBox="1"/>
+          <p:nvPr/>
+        </p:nvSpPr>
+        <p:spPr>
+          <a:xfrm>
+            <a:off x="0" y="3627654"/>
+            <a:ext cx="2981907" cy="246221"/>
+          </a:xfrm>
+          <a:prstGeom prst="rect">
+            <a:avLst/>
+          </a:prstGeom>
+          <a:noFill/>
+        </p:spPr>
+        <p:txBody>
+          <a:bodyPr wrap="none" rtlCol="0">
+            <a:spAutoFit/>
+          </a:bodyPr>
+          <a:lstStyle/>
+          <a:p>
+            <a:r>
+              <a:rPr lang="en-US" sz="1000" dirty="0" err="1"/>
+              <a:t>Andrysik</a:t>
+            </a:r>
+            <a:r>
+              <a:rPr lang="en-US" sz="1000" dirty="0"/>
+              <a:t> et al., 2017, </a:t>
+            </a:r>
+            <a:r>
+              <a:rPr lang="en-US" sz="1000" b="0" i="0" u="none" strike="noStrike" dirty="0" err="1">
+                <a:solidFill>
+                  <a:srgbClr val="212121"/>
+                </a:solidFill>
+                <a:effectLst/>
+                <a:latin typeface="Helvetica Neue" panose="02000503000000020004" pitchFamily="2" charset="0"/>
+              </a:rPr>
+              <a:t>doi</a:t>
+            </a:r>
+            <a:r>
+              <a:rPr lang="en-US" sz="1000" b="0" i="0" u="none" strike="noStrike" dirty="0">
+                <a:solidFill>
+                  <a:srgbClr val="212121"/>
+                </a:solidFill>
+                <a:effectLst/>
+                <a:latin typeface="Helvetica Neue" panose="02000503000000020004" pitchFamily="2" charset="0"/>
+              </a:rPr>
+              <a:t>: </a:t>
+            </a:r>
+            <a:r>
+              <a:rPr lang="en-US" sz="1000" b="0" i="0" u="sng" dirty="0">
+                <a:solidFill>
+                  <a:srgbClr val="4C2C92"/>
+                </a:solidFill>
+                <a:effectLst/>
+                <a:latin typeface="Helvetica Neue" panose="02000503000000020004" pitchFamily="2" charset="0"/>
+                <a:hlinkClick r:id="rId3"/>
+              </a:rPr>
+              <a:t>10.1101/gr.220533.117</a:t>
+            </a:r>
+            <a:endParaRPr lang="en-US" sz="1000" dirty="0"/>
+          </a:p>
+        </p:txBody>
+      </p:sp>
     </p:spTree>
+    <p:extLst>
+      <p:ext uri="{BB962C8B-B14F-4D97-AF65-F5344CB8AC3E}">
+        <p14:creationId xmlns:p14="http://schemas.microsoft.com/office/powerpoint/2010/main" val="3704109526"/>
+      </p:ext>
+    </p:extLst>
   </p:cSld>
   <p:clrMapOvr>
     <a:masterClrMapping/>
@@ -9869,7 +9563,7 @@
   <p:cSld>
     <p:spTree>
       <p:nvGrpSpPr>
-        <p:cNvPr id="1" name="Shape 88"/>
+        <p:cNvPr id="1" name="Shape 114"/>
         <p:cNvGrpSpPr/>
         <p:nvPr/>
       </p:nvGrpSpPr>
@@ -9883,7 +9577,7 @@
       </p:grpSpPr>
       <p:sp>
         <p:nvSpPr>
-          <p:cNvPr id="89" name="Google Shape;89;p17"/>
+          <p:cNvPr id="115" name="Google Shape;115;p20"/>
           <p:cNvSpPr txBox="1">
             <a:spLocks noGrp="1"/>
           </p:cNvSpPr>
@@ -9893,7 +9587,7 @@
         </p:nvSpPr>
         <p:spPr>
           <a:xfrm>
-            <a:off x="311700" y="191775"/>
+            <a:off x="311700" y="219900"/>
             <a:ext cx="8520600" cy="572700"/>
           </a:xfrm>
           <a:prstGeom prst="rect">
@@ -9925,23 +9619,35 @@
             </a:pPr>
             <a:r>
               <a:rPr lang="en" dirty="0"/>
-              <a:t>The are other tools for counting reads but </a:t>
-            </a:r>
-            <a:r>
-              <a:rPr lang="en" dirty="0" err="1"/>
+              <a:t>Counting reads with </a:t>
+            </a:r>
+            <a:r>
+              <a:rPr lang="en" dirty="0" err="1">
+                <a:highlight>
+                  <a:srgbClr val="EFEFEF"/>
+                </a:highlight>
+                <a:latin typeface="Consolas"/>
+                <a:ea typeface="Consolas"/>
+                <a:cs typeface="Consolas"/>
+                <a:sym typeface="Consolas"/>
+              </a:rPr>
               <a:t>featureCounts</a:t>
             </a:r>
-            <a:r>
-              <a:rPr lang="en" dirty="0"/>
-              <a:t> is more efficient</a:t>
-            </a:r>
-            <a:endParaRPr dirty="0"/>
+            <a:endParaRPr b="1" dirty="0">
+              <a:highlight>
+                <a:srgbClr val="EFEFEF"/>
+              </a:highlight>
+              <a:latin typeface="Consolas"/>
+              <a:ea typeface="Consolas"/>
+              <a:cs typeface="Consolas"/>
+              <a:sym typeface="Consolas"/>
+            </a:endParaRPr>
           </a:p>
         </p:txBody>
       </p:sp>
       <p:sp>
         <p:nvSpPr>
-          <p:cNvPr id="90" name="Google Shape;90;p17"/>
+          <p:cNvPr id="116" name="Google Shape;116;p20"/>
           <p:cNvSpPr txBox="1">
             <a:spLocks noGrp="1"/>
           </p:cNvSpPr>
@@ -9951,8 +9657,8 @@
         </p:nvSpPr>
         <p:spPr>
           <a:xfrm>
-            <a:off x="311700" y="4215275"/>
-            <a:ext cx="8520600" cy="517800"/>
+            <a:off x="311700" y="1266000"/>
+            <a:ext cx="8520600" cy="2506500"/>
           </a:xfrm>
           <a:prstGeom prst="rect">
             <a:avLst/>
@@ -9968,7 +9674,7 @@
           </a:bodyPr>
           <a:lstStyle/>
           <a:p>
-            <a:pPr marL="0" lvl="0" indent="0" algn="ctr" rtl="0">
+            <a:pPr marL="457200" lvl="0" indent="-355600" algn="l" rtl="0">
               <a:lnSpc>
                 <a:spcPct val="115000"/>
               </a:lnSpc>
@@ -9976,90 +9682,521 @@
                 <a:spcPts val="0"/>
               </a:spcBef>
               <a:spcAft>
-                <a:spcPts val="1200"/>
-              </a:spcAft>
-              <a:buSzPts val="1800"/>
-              <a:buNone/>
+                <a:spcPts val="0"/>
+              </a:spcAft>
+              <a:buSzPts val="2000"/>
+              <a:buChar char="●"/>
             </a:pPr>
+            <a:r>
+              <a:rPr lang="en" sz="2000" dirty="0"/>
+              <a:t>Follow </a:t>
+            </a:r>
             <a:r>
               <a:rPr lang="en" sz="2000" dirty="0" err="1">
                 <a:solidFill>
-                  <a:schemeClr val="dk1"/>
+                  <a:srgbClr val="1155CC"/>
                 </a:solidFill>
-                <a:highlight>
-                  <a:srgbClr val="EFEFEF"/>
-                </a:highlight>
+              </a:rPr>
+              <a:t>featureCounts</a:t>
+            </a:r>
+            <a:r>
+              <a:rPr lang="en" sz="2000" dirty="0"/>
+              <a:t> worksheet:</a:t>
+            </a:r>
+            <a:endParaRPr sz="2000" dirty="0"/>
+          </a:p>
+          <a:p>
+            <a:pPr marL="914400" lvl="1" indent="-355600" algn="l" rtl="0">
+              <a:lnSpc>
+                <a:spcPct val="115000"/>
+              </a:lnSpc>
+              <a:spcBef>
+                <a:spcPts val="0"/>
+              </a:spcBef>
+              <a:spcAft>
+                <a:spcPts val="0"/>
+              </a:spcAft>
+              <a:buSzPts val="2000"/>
+              <a:buChar char="○"/>
+            </a:pPr>
+            <a:r>
+              <a:rPr lang="en" sz="2000" dirty="0"/>
+              <a:t>Open </a:t>
+            </a:r>
+            <a:r>
+              <a:rPr lang="en" sz="2000" dirty="0">
                 <a:latin typeface="Consolas"/>
                 <a:ea typeface="Consolas"/>
                 <a:cs typeface="Consolas"/>
                 <a:sym typeface="Consolas"/>
               </a:rPr>
-              <a:t>featureCounts</a:t>
+              <a:t>R</a:t>
+            </a:r>
+            <a:r>
+              <a:rPr lang="en" sz="2000" dirty="0"/>
+              <a:t> and install </a:t>
+            </a:r>
+            <a:r>
+              <a:rPr lang="en" sz="2000" dirty="0" err="1">
+                <a:latin typeface="Consolas"/>
+                <a:ea typeface="Consolas"/>
+                <a:cs typeface="Consolas"/>
+                <a:sym typeface="Consolas"/>
+              </a:rPr>
+              <a:t>Rsubread</a:t>
             </a:r>
             <a:r>
               <a:rPr lang="en" sz="2000" dirty="0">
-                <a:latin typeface="Helvetica Neue"/>
-                <a:ea typeface="Helvetica Neue"/>
-                <a:cs typeface="Helvetica Neue"/>
-                <a:sym typeface="Helvetica Neue"/>
+                <a:latin typeface="Consolas"/>
+                <a:ea typeface="Consolas"/>
+                <a:cs typeface="Consolas"/>
+                <a:sym typeface="Consolas"/>
               </a:rPr>
-              <a:t> </a:t>
+              <a:t> on AWS</a:t>
+            </a:r>
+            <a:endParaRPr sz="2000" dirty="0">
+              <a:latin typeface="Consolas"/>
+              <a:ea typeface="Consolas"/>
+              <a:cs typeface="Consolas"/>
+              <a:sym typeface="Consolas"/>
+            </a:endParaRPr>
+          </a:p>
+          <a:p>
+            <a:pPr marL="914400" lvl="1" indent="-355600" algn="l" rtl="0">
+              <a:lnSpc>
+                <a:spcPct val="115000"/>
+              </a:lnSpc>
+              <a:spcBef>
+                <a:spcPts val="0"/>
+              </a:spcBef>
+              <a:spcAft>
+                <a:spcPts val="0"/>
+              </a:spcAft>
+              <a:buSzPts val="2000"/>
+              <a:buChar char="○"/>
+            </a:pPr>
+            <a:r>
+              <a:rPr lang="en" sz="2000" dirty="0"/>
+              <a:t>Get </a:t>
             </a:r>
             <a:r>
               <a:rPr lang="en" sz="2000" dirty="0">
-                <a:latin typeface="Arial" panose="020B0604020202020204" pitchFamily="34" charset="0"/>
-                <a:ea typeface="Helvetica Neue"/>
-                <a:cs typeface="Arial" panose="020B0604020202020204" pitchFamily="34" charset="0"/>
-                <a:sym typeface="Helvetica Neue"/>
+                <a:latin typeface="Consolas"/>
+                <a:ea typeface="Consolas"/>
+                <a:cs typeface="Consolas"/>
+                <a:sym typeface="Consolas"/>
               </a:rPr>
-              <a:t>is faster and more efficient.</a:t>
+              <a:t>d7_featureCounts.R</a:t>
+            </a:r>
+            <a:r>
+              <a:rPr lang="en" sz="2000" dirty="0"/>
+              <a:t> and </a:t>
+            </a:r>
+            <a:r>
+              <a:rPr lang="en" sz="2000" dirty="0">
+                <a:latin typeface="Consolas"/>
+                <a:ea typeface="Consolas"/>
+                <a:cs typeface="Consolas"/>
+                <a:sym typeface="Consolas"/>
+              </a:rPr>
+              <a:t>d7_featureCounts.sbatch</a:t>
+            </a:r>
+            <a:r>
+              <a:rPr lang="en" sz="2000" dirty="0"/>
+              <a:t> scripts  </a:t>
             </a:r>
             <a:endParaRPr sz="2000" dirty="0">
-              <a:latin typeface="Arial" panose="020B0604020202020204" pitchFamily="34" charset="0"/>
-              <a:ea typeface="Helvetica Neue"/>
-              <a:cs typeface="Arial" panose="020B0604020202020204" pitchFamily="34" charset="0"/>
-              <a:sym typeface="Helvetica Neue"/>
+              <a:latin typeface="Consolas"/>
+              <a:ea typeface="Consolas"/>
+              <a:cs typeface="Consolas"/>
+              <a:sym typeface="Consolas"/>
             </a:endParaRPr>
+          </a:p>
+          <a:p>
+            <a:pPr marL="914400" lvl="1" indent="-355600" algn="l" rtl="0">
+              <a:lnSpc>
+                <a:spcPct val="115000"/>
+              </a:lnSpc>
+              <a:spcBef>
+                <a:spcPts val="0"/>
+              </a:spcBef>
+              <a:spcAft>
+                <a:spcPts val="0"/>
+              </a:spcAft>
+              <a:buSzPts val="2000"/>
+              <a:buChar char="○"/>
+            </a:pPr>
+            <a:r>
+              <a:rPr lang="en" sz="2000" dirty="0"/>
+              <a:t>Edit both scripts and execute the </a:t>
+            </a:r>
+            <a:r>
+              <a:rPr lang="en" sz="2000" dirty="0" err="1">
+                <a:latin typeface="Consolas"/>
+                <a:ea typeface="Consolas"/>
+                <a:cs typeface="Consolas"/>
+                <a:sym typeface="Consolas"/>
+              </a:rPr>
+              <a:t>sbatch</a:t>
+            </a:r>
+            <a:r>
+              <a:rPr lang="en" sz="2000" dirty="0"/>
+              <a:t> script </a:t>
+            </a:r>
+            <a:endParaRPr sz="2000" dirty="0"/>
           </a:p>
         </p:txBody>
       </p:sp>
-      <p:pic>
-        <p:nvPicPr>
-          <p:cNvPr id="91" name="Google Shape;91;p17"/>
-          <p:cNvPicPr preferRelativeResize="0"/>
-          <p:nvPr/>
-        </p:nvPicPr>
-        <p:blipFill rotWithShape="1">
-          <a:blip r:embed="rId3">
-            <a:alphaModFix/>
-          </a:blip>
-          <a:srcRect/>
-          <a:stretch/>
-        </p:blipFill>
+    </p:spTree>
+  </p:cSld>
+  <p:clrMapOvr>
+    <a:masterClrMapping/>
+  </p:clrMapOvr>
+</p:sld>
+</file>
+
+<file path=ppt/slides/slide6.xml><?xml version="1.0" encoding="utf-8"?>
+<p:sld xmlns:a="http://schemas.openxmlformats.org/drawingml/2006/main" xmlns:r="http://schemas.openxmlformats.org/officeDocument/2006/relationships" xmlns:p="http://schemas.openxmlformats.org/presentationml/2006/main">
+  <p:cSld>
+    <p:spTree>
+      <p:nvGrpSpPr>
+        <p:cNvPr id="1" name="Shape 120"/>
+        <p:cNvGrpSpPr/>
+        <p:nvPr/>
+      </p:nvGrpSpPr>
+      <p:grpSpPr>
+        <a:xfrm>
+          <a:off x="0" y="0"/>
+          <a:ext cx="0" cy="0"/>
+          <a:chOff x="0" y="0"/>
+          <a:chExt cx="0" cy="0"/>
+        </a:xfrm>
+      </p:grpSpPr>
+      <p:sp>
+        <p:nvSpPr>
+          <p:cNvPr id="121" name="Google Shape;121;p21"/>
+          <p:cNvSpPr txBox="1">
+            <a:spLocks noGrp="1"/>
+          </p:cNvSpPr>
+          <p:nvPr>
+            <p:ph type="title"/>
+          </p:nvPr>
+        </p:nvSpPr>
         <p:spPr>
           <a:xfrm>
-            <a:off x="1384213" y="1317725"/>
-            <a:ext cx="6375552" cy="2771978"/>
+            <a:off x="311700" y="445025"/>
+            <a:ext cx="8520600" cy="572700"/>
           </a:xfrm>
           <a:prstGeom prst="rect">
             <a:avLst/>
           </a:prstGeom>
-          <a:noFill/>
-          <a:ln>
-            <a:noFill/>
-          </a:ln>
         </p:spPr>
-      </p:pic>
+        <p:txBody>
+          <a:bodyPr spcFirstLastPara="1" wrap="square" lIns="91425" tIns="91425" rIns="91425" bIns="91425" anchor="t" anchorCtr="0">
+            <a:normAutofit fontScale="90000"/>
+          </a:bodyPr>
+          <a:lstStyle/>
+          <a:p>
+            <a:pPr marL="0" lvl="0" indent="0" algn="ctr" rtl="0">
+              <a:spcBef>
+                <a:spcPts val="0"/>
+              </a:spcBef>
+              <a:spcAft>
+                <a:spcPts val="0"/>
+              </a:spcAft>
+              <a:buNone/>
+            </a:pPr>
+            <a:r>
+              <a:rPr lang="en" dirty="0"/>
+              <a:t>Challenge Question</a:t>
+            </a:r>
+            <a:endParaRPr dirty="0"/>
+          </a:p>
+        </p:txBody>
+      </p:sp>
       <p:sp>
         <p:nvSpPr>
-          <p:cNvPr id="92" name="Google Shape;92;p17"/>
+          <p:cNvPr id="122" name="Google Shape;122;p21"/>
+          <p:cNvSpPr txBox="1">
+            <a:spLocks noGrp="1"/>
+          </p:cNvSpPr>
+          <p:nvPr>
+            <p:ph type="body" idx="1"/>
+          </p:nvPr>
+        </p:nvSpPr>
+        <p:spPr>
+          <a:xfrm>
+            <a:off x="311700" y="1152475"/>
+            <a:ext cx="8520600" cy="3416400"/>
+          </a:xfrm>
+          <a:prstGeom prst="rect">
+            <a:avLst/>
+          </a:prstGeom>
+        </p:spPr>
+        <p:txBody>
+          <a:bodyPr spcFirstLastPara="1" wrap="square" lIns="91425" tIns="91425" rIns="91425" bIns="91425" anchor="t" anchorCtr="0">
+            <a:normAutofit/>
+          </a:bodyPr>
+          <a:lstStyle/>
+          <a:p>
+            <a:pPr marL="457200" lvl="0" indent="-355600" algn="l" rtl="0">
+              <a:spcBef>
+                <a:spcPts val="0"/>
+              </a:spcBef>
+              <a:spcAft>
+                <a:spcPts val="0"/>
+              </a:spcAft>
+              <a:buSzPts val="2000"/>
+              <a:buChar char="●"/>
+            </a:pPr>
+            <a:r>
+              <a:rPr lang="en" sz="2000" dirty="0"/>
+              <a:t>What feature would you used to count reads for RNA-seq?</a:t>
+            </a:r>
+            <a:endParaRPr sz="2000" dirty="0"/>
+          </a:p>
+          <a:p>
+            <a:pPr marL="457200" lvl="0" indent="-355600" algn="l" rtl="0">
+              <a:lnSpc>
+                <a:spcPct val="150000"/>
+              </a:lnSpc>
+              <a:spcBef>
+                <a:spcPts val="0"/>
+              </a:spcBef>
+              <a:spcAft>
+                <a:spcPts val="0"/>
+              </a:spcAft>
+              <a:buSzPts val="2000"/>
+              <a:buAutoNum type="alphaUcPeriod"/>
+            </a:pPr>
+            <a:r>
+              <a:rPr lang="en" sz="2000" dirty="0"/>
+              <a:t>Gene</a:t>
+            </a:r>
+            <a:endParaRPr sz="2000" dirty="0"/>
+          </a:p>
+          <a:p>
+            <a:pPr marL="457200" lvl="0" indent="-355600" algn="l" rtl="0">
+              <a:lnSpc>
+                <a:spcPct val="150000"/>
+              </a:lnSpc>
+              <a:spcBef>
+                <a:spcPts val="0"/>
+              </a:spcBef>
+              <a:spcAft>
+                <a:spcPts val="0"/>
+              </a:spcAft>
+              <a:buSzPts val="2000"/>
+              <a:buAutoNum type="alphaUcPeriod"/>
+            </a:pPr>
+            <a:r>
+              <a:rPr lang="en" sz="2000" dirty="0"/>
+              <a:t>Exon</a:t>
+            </a:r>
+            <a:endParaRPr sz="2000" dirty="0"/>
+          </a:p>
+          <a:p>
+            <a:pPr marL="457200" lvl="0" indent="-355600" algn="l" rtl="0">
+              <a:lnSpc>
+                <a:spcPct val="150000"/>
+              </a:lnSpc>
+              <a:spcBef>
+                <a:spcPts val="0"/>
+              </a:spcBef>
+              <a:spcAft>
+                <a:spcPts val="0"/>
+              </a:spcAft>
+              <a:buSzPts val="2000"/>
+              <a:buAutoNum type="alphaUcPeriod"/>
+            </a:pPr>
+            <a:r>
+              <a:rPr lang="en" sz="2000" dirty="0"/>
+              <a:t>Transcripts</a:t>
+            </a:r>
+            <a:endParaRPr sz="2000" dirty="0"/>
+          </a:p>
+        </p:txBody>
+      </p:sp>
+    </p:spTree>
+  </p:cSld>
+  <p:clrMapOvr>
+    <a:masterClrMapping/>
+  </p:clrMapOvr>
+</p:sld>
+</file>
+
+<file path=ppt/slides/slide7.xml><?xml version="1.0" encoding="utf-8"?>
+<p:sld xmlns:a="http://schemas.openxmlformats.org/drawingml/2006/main" xmlns:r="http://schemas.openxmlformats.org/officeDocument/2006/relationships" xmlns:p="http://schemas.openxmlformats.org/presentationml/2006/main">
+  <p:cSld>
+    <p:spTree>
+      <p:nvGrpSpPr>
+        <p:cNvPr id="1" name="Shape 126"/>
+        <p:cNvGrpSpPr/>
+        <p:nvPr/>
+      </p:nvGrpSpPr>
+      <p:grpSpPr>
+        <a:xfrm>
+          <a:off x="0" y="0"/>
+          <a:ext cx="0" cy="0"/>
+          <a:chOff x="0" y="0"/>
+          <a:chExt cx="0" cy="0"/>
+        </a:xfrm>
+      </p:grpSpPr>
+      <p:sp>
+        <p:nvSpPr>
+          <p:cNvPr id="127" name="Google Shape;127;p22"/>
+          <p:cNvSpPr txBox="1">
+            <a:spLocks noGrp="1"/>
+          </p:cNvSpPr>
+          <p:nvPr>
+            <p:ph type="title"/>
+          </p:nvPr>
+        </p:nvSpPr>
+        <p:spPr>
+          <a:xfrm>
+            <a:off x="311700" y="445025"/>
+            <a:ext cx="8520600" cy="572700"/>
+          </a:xfrm>
+          <a:prstGeom prst="rect">
+            <a:avLst/>
+          </a:prstGeom>
+        </p:spPr>
+        <p:txBody>
+          <a:bodyPr spcFirstLastPara="1" wrap="square" lIns="91425" tIns="91425" rIns="91425" bIns="91425" anchor="t" anchorCtr="0">
+            <a:normAutofit fontScale="90000"/>
+          </a:bodyPr>
+          <a:lstStyle/>
+          <a:p>
+            <a:pPr marL="0" lvl="0" indent="0" algn="ctr" rtl="0">
+              <a:spcBef>
+                <a:spcPts val="0"/>
+              </a:spcBef>
+              <a:spcAft>
+                <a:spcPts val="0"/>
+              </a:spcAft>
+              <a:buNone/>
+            </a:pPr>
+            <a:r>
+              <a:rPr lang="en"/>
+              <a:t>Challenge Question</a:t>
+            </a:r>
+            <a:endParaRPr/>
+          </a:p>
+        </p:txBody>
+      </p:sp>
+      <p:sp>
+        <p:nvSpPr>
+          <p:cNvPr id="128" name="Google Shape;128;p22"/>
+          <p:cNvSpPr txBox="1">
+            <a:spLocks noGrp="1"/>
+          </p:cNvSpPr>
+          <p:nvPr>
+            <p:ph type="body" idx="1"/>
+          </p:nvPr>
+        </p:nvSpPr>
+        <p:spPr>
+          <a:xfrm>
+            <a:off x="311700" y="1152475"/>
+            <a:ext cx="8520600" cy="3416400"/>
+          </a:xfrm>
+          <a:prstGeom prst="rect">
+            <a:avLst/>
+          </a:prstGeom>
+        </p:spPr>
+        <p:txBody>
+          <a:bodyPr spcFirstLastPara="1" wrap="square" lIns="91425" tIns="91425" rIns="91425" bIns="91425" anchor="t" anchorCtr="0">
+            <a:normAutofit/>
+          </a:bodyPr>
+          <a:lstStyle/>
+          <a:p>
+            <a:pPr marL="457200" lvl="0" indent="-355600" algn="l" rtl="0">
+              <a:spcBef>
+                <a:spcPts val="0"/>
+              </a:spcBef>
+              <a:spcAft>
+                <a:spcPts val="0"/>
+              </a:spcAft>
+              <a:buSzPts val="2000"/>
+              <a:buChar char="●"/>
+            </a:pPr>
+            <a:r>
+              <a:rPr lang="en" sz="2000" dirty="0"/>
+              <a:t>What feature would you used to count reads for RNA-seq?</a:t>
+            </a:r>
+            <a:endParaRPr sz="2000" dirty="0"/>
+          </a:p>
+          <a:p>
+            <a:pPr marL="457200" lvl="0" indent="-355600" algn="l" rtl="0">
+              <a:lnSpc>
+                <a:spcPct val="150000"/>
+              </a:lnSpc>
+              <a:spcBef>
+                <a:spcPts val="0"/>
+              </a:spcBef>
+              <a:spcAft>
+                <a:spcPts val="0"/>
+              </a:spcAft>
+              <a:buSzPts val="2000"/>
+              <a:buAutoNum type="alphaUcPeriod"/>
+            </a:pPr>
+            <a:r>
+              <a:rPr lang="en" sz="2000" dirty="0"/>
+              <a:t>Gene</a:t>
+            </a:r>
+            <a:endParaRPr sz="2000" dirty="0"/>
+          </a:p>
+          <a:p>
+            <a:pPr marL="457200" lvl="0" indent="-355600" algn="l" rtl="0">
+              <a:lnSpc>
+                <a:spcPct val="150000"/>
+              </a:lnSpc>
+              <a:spcBef>
+                <a:spcPts val="0"/>
+              </a:spcBef>
+              <a:spcAft>
+                <a:spcPts val="0"/>
+              </a:spcAft>
+              <a:buSzPts val="2000"/>
+              <a:buAutoNum type="alphaUcPeriod"/>
+            </a:pPr>
+            <a:r>
+              <a:rPr lang="en" sz="2000" dirty="0"/>
+              <a:t>Exon</a:t>
+            </a:r>
+            <a:endParaRPr sz="2000" dirty="0"/>
+          </a:p>
+          <a:p>
+            <a:pPr marL="457200" lvl="0" indent="-355600" algn="l" rtl="0">
+              <a:lnSpc>
+                <a:spcPct val="150000"/>
+              </a:lnSpc>
+              <a:spcBef>
+                <a:spcPts val="0"/>
+              </a:spcBef>
+              <a:spcAft>
+                <a:spcPts val="0"/>
+              </a:spcAft>
+              <a:buSzPts val="2000"/>
+              <a:buAutoNum type="alphaUcPeriod"/>
+            </a:pPr>
+            <a:r>
+              <a:rPr lang="en" sz="2000" dirty="0"/>
+              <a:t>Transcripts</a:t>
+            </a:r>
+            <a:endParaRPr sz="2000" dirty="0"/>
+          </a:p>
+        </p:txBody>
+      </p:sp>
+      <p:sp>
+        <p:nvSpPr>
+          <p:cNvPr id="129" name="Google Shape;129;p22"/>
           <p:cNvSpPr txBox="1"/>
           <p:nvPr/>
         </p:nvSpPr>
         <p:spPr>
           <a:xfrm>
-            <a:off x="1550550" y="4733075"/>
-            <a:ext cx="6042900" cy="369300"/>
+            <a:off x="1619663" y="1980362"/>
+            <a:ext cx="579900" cy="431100"/>
           </a:xfrm>
           <a:prstGeom prst="rect">
             <a:avLst/>
@@ -10075,43 +10212,27 @@
           </a:bodyPr>
           <a:lstStyle/>
           <a:p>
-            <a:pPr marL="0" marR="0" lvl="0" indent="0" algn="ctr" rtl="0">
-              <a:lnSpc>
-                <a:spcPct val="100000"/>
-              </a:lnSpc>
-              <a:spcBef>
-                <a:spcPts val="0"/>
-              </a:spcBef>
-              <a:spcAft>
-                <a:spcPts val="0"/>
-              </a:spcAft>
-              <a:buClr>
-                <a:srgbClr val="000000"/>
-              </a:buClr>
-              <a:buSzPts val="1200"/>
-              <a:buFont typeface="Arial"/>
+            <a:pPr marL="0" lvl="0" indent="0" algn="l" rtl="0">
+              <a:spcBef>
+                <a:spcPts val="0"/>
+              </a:spcBef>
+              <a:spcAft>
+                <a:spcPts val="0"/>
+              </a:spcAft>
               <a:buNone/>
             </a:pPr>
             <a:r>
-              <a:rPr lang="en" sz="1200" b="0" i="0" u="none" strike="noStrike" cap="none" dirty="0">
+              <a:rPr lang="en" sz="1600">
                 <a:solidFill>
-                  <a:srgbClr val="000000"/>
+                  <a:srgbClr val="1155CC"/>
                 </a:solidFill>
-                <a:latin typeface="Arial" panose="020B0604020202020204" pitchFamily="34" charset="0"/>
-                <a:ea typeface="Helvetica Neue"/>
-                <a:cs typeface="Arial" panose="020B0604020202020204" pitchFamily="34" charset="0"/>
-                <a:sym typeface="Helvetica Neue"/>
               </a:rPr>
-              <a:t>Liao et al. Bioinformatics 2014 doi:10.1093/bioinformatics/btt656</a:t>
-            </a:r>
-            <a:endParaRPr sz="1200" b="0" i="0" u="none" strike="noStrike" cap="none" dirty="0">
+              <a:t>✓</a:t>
+            </a:r>
+            <a:endParaRPr sz="1600">
               <a:solidFill>
-                <a:srgbClr val="000000"/>
+                <a:srgbClr val="1155CC"/>
               </a:solidFill>
-              <a:latin typeface="Arial" panose="020B0604020202020204" pitchFamily="34" charset="0"/>
-              <a:ea typeface="Helvetica Neue"/>
-              <a:cs typeface="Arial" panose="020B0604020202020204" pitchFamily="34" charset="0"/>
-              <a:sym typeface="Helvetica Neue"/>
             </a:endParaRPr>
           </a:p>
         </p:txBody>
@@ -10124,7 +10245,7 @@
 </p:sld>
 </file>
 
-<file path=ppt/slides/slide6.xml><?xml version="1.0" encoding="utf-8"?>
+<file path=ppt/slides/slide8.xml><?xml version="1.0" encoding="utf-8"?>
 <p:sld xmlns:a="http://schemas.openxmlformats.org/drawingml/2006/main" xmlns:r="http://schemas.openxmlformats.org/officeDocument/2006/relationships" xmlns:p="http://schemas.openxmlformats.org/presentationml/2006/main">
   <p:cSld>
     <p:spTree>
@@ -10368,7 +10489,7 @@
 </p:sld>
 </file>
 
-<file path=ppt/slides/slide7.xml><?xml version="1.0" encoding="utf-8"?>
+<file path=ppt/slides/slide9.xml><?xml version="1.0" encoding="utf-8"?>
 <p:sld xmlns:a="http://schemas.openxmlformats.org/drawingml/2006/main" xmlns:r="http://schemas.openxmlformats.org/officeDocument/2006/relationships" xmlns:p="http://schemas.openxmlformats.org/presentationml/2006/main">
   <p:cSld>
     <p:spTree>
@@ -10636,464 +10757,6 @@
               <a:t>DESeq2 Recap</a:t>
             </a:r>
             <a:endParaRPr dirty="0"/>
-          </a:p>
-        </p:txBody>
-      </p:sp>
-    </p:spTree>
-  </p:cSld>
-  <p:clrMapOvr>
-    <a:masterClrMapping/>
-  </p:clrMapOvr>
-</p:sld>
-</file>
-
-<file path=ppt/slides/slide8.xml><?xml version="1.0" encoding="utf-8"?>
-<p:sld xmlns:a="http://schemas.openxmlformats.org/drawingml/2006/main" xmlns:r="http://schemas.openxmlformats.org/officeDocument/2006/relationships" xmlns:p="http://schemas.openxmlformats.org/presentationml/2006/main">
-  <p:cSld>
-    <p:spTree>
-      <p:nvGrpSpPr>
-        <p:cNvPr id="1" name="Shape 114"/>
-        <p:cNvGrpSpPr/>
-        <p:nvPr/>
-      </p:nvGrpSpPr>
-      <p:grpSpPr>
-        <a:xfrm>
-          <a:off x="0" y="0"/>
-          <a:ext cx="0" cy="0"/>
-          <a:chOff x="0" y="0"/>
-          <a:chExt cx="0" cy="0"/>
-        </a:xfrm>
-      </p:grpSpPr>
-      <p:sp>
-        <p:nvSpPr>
-          <p:cNvPr id="115" name="Google Shape;115;p20"/>
-          <p:cNvSpPr txBox="1">
-            <a:spLocks noGrp="1"/>
-          </p:cNvSpPr>
-          <p:nvPr>
-            <p:ph type="title"/>
-          </p:nvPr>
-        </p:nvSpPr>
-        <p:spPr>
-          <a:xfrm>
-            <a:off x="311700" y="219900"/>
-            <a:ext cx="8520600" cy="572700"/>
-          </a:xfrm>
-          <a:prstGeom prst="rect">
-            <a:avLst/>
-          </a:prstGeom>
-          <a:noFill/>
-          <a:ln>
-            <a:noFill/>
-          </a:ln>
-        </p:spPr>
-        <p:txBody>
-          <a:bodyPr spcFirstLastPara="1" wrap="square" lIns="91425" tIns="91425" rIns="91425" bIns="91425" anchor="t" anchorCtr="0">
-            <a:normAutofit fontScale="90000"/>
-          </a:bodyPr>
-          <a:lstStyle/>
-          <a:p>
-            <a:pPr marL="0" lvl="0" indent="0" algn="ctr" rtl="0">
-              <a:lnSpc>
-                <a:spcPct val="100000"/>
-              </a:lnSpc>
-              <a:spcBef>
-                <a:spcPts val="0"/>
-              </a:spcBef>
-              <a:spcAft>
-                <a:spcPts val="0"/>
-              </a:spcAft>
-              <a:buSzPct val="111111"/>
-              <a:buNone/>
-            </a:pPr>
-            <a:r>
-              <a:rPr lang="en" dirty="0"/>
-              <a:t>Counting reads with </a:t>
-            </a:r>
-            <a:r>
-              <a:rPr lang="en" dirty="0" err="1">
-                <a:highlight>
-                  <a:srgbClr val="EFEFEF"/>
-                </a:highlight>
-                <a:latin typeface="Consolas"/>
-                <a:ea typeface="Consolas"/>
-                <a:cs typeface="Consolas"/>
-                <a:sym typeface="Consolas"/>
-              </a:rPr>
-              <a:t>featureCounts</a:t>
-            </a:r>
-            <a:endParaRPr b="1" dirty="0">
-              <a:highlight>
-                <a:srgbClr val="EFEFEF"/>
-              </a:highlight>
-              <a:latin typeface="Consolas"/>
-              <a:ea typeface="Consolas"/>
-              <a:cs typeface="Consolas"/>
-              <a:sym typeface="Consolas"/>
-            </a:endParaRPr>
-          </a:p>
-        </p:txBody>
-      </p:sp>
-      <p:sp>
-        <p:nvSpPr>
-          <p:cNvPr id="116" name="Google Shape;116;p20"/>
-          <p:cNvSpPr txBox="1">
-            <a:spLocks noGrp="1"/>
-          </p:cNvSpPr>
-          <p:nvPr>
-            <p:ph type="body" idx="1"/>
-          </p:nvPr>
-        </p:nvSpPr>
-        <p:spPr>
-          <a:xfrm>
-            <a:off x="311700" y="1266000"/>
-            <a:ext cx="8520600" cy="2506500"/>
-          </a:xfrm>
-          <a:prstGeom prst="rect">
-            <a:avLst/>
-          </a:prstGeom>
-          <a:noFill/>
-          <a:ln>
-            <a:noFill/>
-          </a:ln>
-        </p:spPr>
-        <p:txBody>
-          <a:bodyPr spcFirstLastPara="1" wrap="square" lIns="91425" tIns="91425" rIns="91425" bIns="91425" anchor="t" anchorCtr="0">
-            <a:noAutofit/>
-          </a:bodyPr>
-          <a:lstStyle/>
-          <a:p>
-            <a:pPr marL="457200" lvl="0" indent="-355600" algn="l" rtl="0">
-              <a:lnSpc>
-                <a:spcPct val="115000"/>
-              </a:lnSpc>
-              <a:spcBef>
-                <a:spcPts val="0"/>
-              </a:spcBef>
-              <a:spcAft>
-                <a:spcPts val="0"/>
-              </a:spcAft>
-              <a:buSzPts val="2000"/>
-              <a:buChar char="●"/>
-            </a:pPr>
-            <a:r>
-              <a:rPr lang="en" sz="2000" dirty="0"/>
-              <a:t>Follow </a:t>
-            </a:r>
-            <a:r>
-              <a:rPr lang="en" sz="2000" dirty="0" err="1">
-                <a:solidFill>
-                  <a:srgbClr val="1155CC"/>
-                </a:solidFill>
-              </a:rPr>
-              <a:t>featureCounts</a:t>
-            </a:r>
-            <a:r>
-              <a:rPr lang="en" sz="2000" dirty="0"/>
-              <a:t> worksheet:</a:t>
-            </a:r>
-            <a:endParaRPr sz="2000" dirty="0"/>
-          </a:p>
-          <a:p>
-            <a:pPr marL="914400" lvl="1" indent="-355600" algn="l" rtl="0">
-              <a:lnSpc>
-                <a:spcPct val="115000"/>
-              </a:lnSpc>
-              <a:spcBef>
-                <a:spcPts val="0"/>
-              </a:spcBef>
-              <a:spcAft>
-                <a:spcPts val="0"/>
-              </a:spcAft>
-              <a:buSzPts val="2000"/>
-              <a:buChar char="○"/>
-            </a:pPr>
-            <a:r>
-              <a:rPr lang="en" sz="2000" dirty="0"/>
-              <a:t>Open </a:t>
-            </a:r>
-            <a:r>
-              <a:rPr lang="en" sz="2000" dirty="0">
-                <a:latin typeface="Consolas"/>
-                <a:ea typeface="Consolas"/>
-                <a:cs typeface="Consolas"/>
-                <a:sym typeface="Consolas"/>
-              </a:rPr>
-              <a:t>R</a:t>
-            </a:r>
-            <a:r>
-              <a:rPr lang="en" sz="2000" dirty="0"/>
-              <a:t> and install </a:t>
-            </a:r>
-            <a:r>
-              <a:rPr lang="en" sz="2000" dirty="0" err="1">
-                <a:latin typeface="Consolas"/>
-                <a:ea typeface="Consolas"/>
-                <a:cs typeface="Consolas"/>
-                <a:sym typeface="Consolas"/>
-              </a:rPr>
-              <a:t>Rsubread</a:t>
-            </a:r>
-            <a:endParaRPr sz="2000" dirty="0">
-              <a:latin typeface="Consolas"/>
-              <a:ea typeface="Consolas"/>
-              <a:cs typeface="Consolas"/>
-              <a:sym typeface="Consolas"/>
-            </a:endParaRPr>
-          </a:p>
-          <a:p>
-            <a:pPr marL="914400" lvl="1" indent="-355600" algn="l" rtl="0">
-              <a:lnSpc>
-                <a:spcPct val="115000"/>
-              </a:lnSpc>
-              <a:spcBef>
-                <a:spcPts val="0"/>
-              </a:spcBef>
-              <a:spcAft>
-                <a:spcPts val="0"/>
-              </a:spcAft>
-              <a:buSzPts val="2000"/>
-              <a:buChar char="○"/>
-            </a:pPr>
-            <a:r>
-              <a:rPr lang="en" sz="2000" dirty="0"/>
-              <a:t>Get </a:t>
-            </a:r>
-            <a:r>
-              <a:rPr lang="en" sz="2000" dirty="0">
-                <a:latin typeface="Consolas"/>
-                <a:ea typeface="Consolas"/>
-                <a:cs typeface="Consolas"/>
-                <a:sym typeface="Consolas"/>
-              </a:rPr>
-              <a:t>d7_featureCounts.R</a:t>
-            </a:r>
-            <a:r>
-              <a:rPr lang="en" sz="2000" dirty="0"/>
-              <a:t> and </a:t>
-            </a:r>
-            <a:r>
-              <a:rPr lang="en" sz="2000" dirty="0">
-                <a:latin typeface="Consolas"/>
-                <a:ea typeface="Consolas"/>
-                <a:cs typeface="Consolas"/>
-                <a:sym typeface="Consolas"/>
-              </a:rPr>
-              <a:t>d7_featureCounts.sbatch</a:t>
-            </a:r>
-            <a:r>
-              <a:rPr lang="en" sz="2000" dirty="0"/>
-              <a:t> scripts  </a:t>
-            </a:r>
-            <a:endParaRPr sz="2000" dirty="0">
-              <a:latin typeface="Consolas"/>
-              <a:ea typeface="Consolas"/>
-              <a:cs typeface="Consolas"/>
-              <a:sym typeface="Consolas"/>
-            </a:endParaRPr>
-          </a:p>
-          <a:p>
-            <a:pPr marL="914400" lvl="1" indent="-355600" algn="l" rtl="0">
-              <a:lnSpc>
-                <a:spcPct val="115000"/>
-              </a:lnSpc>
-              <a:spcBef>
-                <a:spcPts val="0"/>
-              </a:spcBef>
-              <a:spcAft>
-                <a:spcPts val="0"/>
-              </a:spcAft>
-              <a:buSzPts val="2000"/>
-              <a:buChar char="○"/>
-            </a:pPr>
-            <a:r>
-              <a:rPr lang="en" sz="2000" dirty="0"/>
-              <a:t>Edit both scripts and execute the </a:t>
-            </a:r>
-            <a:r>
-              <a:rPr lang="en" sz="2000" dirty="0" err="1">
-                <a:latin typeface="Consolas"/>
-                <a:ea typeface="Consolas"/>
-                <a:cs typeface="Consolas"/>
-                <a:sym typeface="Consolas"/>
-              </a:rPr>
-              <a:t>sbatch</a:t>
-            </a:r>
-            <a:r>
-              <a:rPr lang="en" sz="2000" dirty="0"/>
-              <a:t> script </a:t>
-            </a:r>
-            <a:endParaRPr sz="2000" dirty="0"/>
-          </a:p>
-        </p:txBody>
-      </p:sp>
-    </p:spTree>
-  </p:cSld>
-  <p:clrMapOvr>
-    <a:masterClrMapping/>
-  </p:clrMapOvr>
-</p:sld>
-</file>
-
-<file path=ppt/slides/slide9.xml><?xml version="1.0" encoding="utf-8"?>
-<p:sld xmlns:a="http://schemas.openxmlformats.org/drawingml/2006/main" xmlns:r="http://schemas.openxmlformats.org/officeDocument/2006/relationships" xmlns:p="http://schemas.openxmlformats.org/presentationml/2006/main">
-  <p:cSld>
-    <p:spTree>
-      <p:nvGrpSpPr>
-        <p:cNvPr id="1" name="Shape 120"/>
-        <p:cNvGrpSpPr/>
-        <p:nvPr/>
-      </p:nvGrpSpPr>
-      <p:grpSpPr>
-        <a:xfrm>
-          <a:off x="0" y="0"/>
-          <a:ext cx="0" cy="0"/>
-          <a:chOff x="0" y="0"/>
-          <a:chExt cx="0" cy="0"/>
-        </a:xfrm>
-      </p:grpSpPr>
-      <p:sp>
-        <p:nvSpPr>
-          <p:cNvPr id="121" name="Google Shape;121;p21"/>
-          <p:cNvSpPr txBox="1">
-            <a:spLocks noGrp="1"/>
-          </p:cNvSpPr>
-          <p:nvPr>
-            <p:ph type="title"/>
-          </p:nvPr>
-        </p:nvSpPr>
-        <p:spPr>
-          <a:xfrm>
-            <a:off x="311700" y="445025"/>
-            <a:ext cx="8520600" cy="572700"/>
-          </a:xfrm>
-          <a:prstGeom prst="rect">
-            <a:avLst/>
-          </a:prstGeom>
-        </p:spPr>
-        <p:txBody>
-          <a:bodyPr spcFirstLastPara="1" wrap="square" lIns="91425" tIns="91425" rIns="91425" bIns="91425" anchor="t" anchorCtr="0">
-            <a:normAutofit fontScale="90000"/>
-          </a:bodyPr>
-          <a:lstStyle/>
-          <a:p>
-            <a:pPr marL="0" lvl="0" indent="0" algn="ctr" rtl="0">
-              <a:spcBef>
-                <a:spcPts val="0"/>
-              </a:spcBef>
-              <a:spcAft>
-                <a:spcPts val="0"/>
-              </a:spcAft>
-              <a:buNone/>
-            </a:pPr>
-            <a:r>
-              <a:rPr lang="en" dirty="0"/>
-              <a:t>Challenge Question</a:t>
-            </a:r>
-            <a:endParaRPr dirty="0"/>
-          </a:p>
-        </p:txBody>
-      </p:sp>
-      <p:sp>
-        <p:nvSpPr>
-          <p:cNvPr id="122" name="Google Shape;122;p21"/>
-          <p:cNvSpPr txBox="1">
-            <a:spLocks noGrp="1"/>
-          </p:cNvSpPr>
-          <p:nvPr>
-            <p:ph type="body" idx="1"/>
-          </p:nvPr>
-        </p:nvSpPr>
-        <p:spPr>
-          <a:xfrm>
-            <a:off x="311700" y="1152475"/>
-            <a:ext cx="8520600" cy="3416400"/>
-          </a:xfrm>
-          <a:prstGeom prst="rect">
-            <a:avLst/>
-          </a:prstGeom>
-        </p:spPr>
-        <p:txBody>
-          <a:bodyPr spcFirstLastPara="1" wrap="square" lIns="91425" tIns="91425" rIns="91425" bIns="91425" anchor="t" anchorCtr="0">
-            <a:normAutofit/>
-          </a:bodyPr>
-          <a:lstStyle/>
-          <a:p>
-            <a:pPr marL="457200" lvl="0" indent="-355600" algn="l" rtl="0">
-              <a:spcBef>
-                <a:spcPts val="0"/>
-              </a:spcBef>
-              <a:spcAft>
-                <a:spcPts val="0"/>
-              </a:spcAft>
-              <a:buSzPts val="2000"/>
-              <a:buChar char="●"/>
-            </a:pPr>
-            <a:r>
-              <a:rPr lang="en" sz="2000" dirty="0"/>
-              <a:t>What feature would you used to count reads for RNA-seq?</a:t>
-            </a:r>
-            <a:endParaRPr sz="2000" dirty="0"/>
-          </a:p>
-          <a:p>
-            <a:pPr marL="457200" lvl="0" indent="-355600" algn="l" rtl="0">
-              <a:lnSpc>
-                <a:spcPct val="150000"/>
-              </a:lnSpc>
-              <a:spcBef>
-                <a:spcPts val="0"/>
-              </a:spcBef>
-              <a:spcAft>
-                <a:spcPts val="0"/>
-              </a:spcAft>
-              <a:buSzPts val="2000"/>
-              <a:buAutoNum type="alphaUcPeriod"/>
-            </a:pPr>
-            <a:r>
-              <a:rPr lang="en" sz="2000" dirty="0"/>
-              <a:t>Gene</a:t>
-            </a:r>
-            <a:endParaRPr sz="2000" dirty="0"/>
-          </a:p>
-          <a:p>
-            <a:pPr marL="457200" lvl="0" indent="-355600" algn="l" rtl="0">
-              <a:lnSpc>
-                <a:spcPct val="150000"/>
-              </a:lnSpc>
-              <a:spcBef>
-                <a:spcPts val="0"/>
-              </a:spcBef>
-              <a:spcAft>
-                <a:spcPts val="0"/>
-              </a:spcAft>
-              <a:buSzPts val="2000"/>
-              <a:buAutoNum type="alphaUcPeriod"/>
-            </a:pPr>
-            <a:r>
-              <a:rPr lang="en" sz="2000" dirty="0"/>
-              <a:t>Exon</a:t>
-            </a:r>
-            <a:endParaRPr sz="2000" dirty="0"/>
-          </a:p>
-          <a:p>
-            <a:pPr marL="457200" lvl="0" indent="-355600" algn="l" rtl="0">
-              <a:lnSpc>
-                <a:spcPct val="150000"/>
-              </a:lnSpc>
-              <a:spcBef>
-                <a:spcPts val="0"/>
-              </a:spcBef>
-              <a:spcAft>
-                <a:spcPts val="0"/>
-              </a:spcAft>
-              <a:buSzPts val="2000"/>
-              <a:buAutoNum type="alphaUcPeriod"/>
-            </a:pPr>
-            <a:r>
-              <a:rPr lang="en" sz="2000" dirty="0"/>
-              <a:t>Transcripts</a:t>
-            </a:r>
-            <a:endParaRPr sz="2000" dirty="0"/>
           </a:p>
         </p:txBody>
       </p:sp>

</xml_diff>